<commit_message>
add feature extraction part
</commit_message>
<xml_diff>
--- a/presentations/FakeNews_Final.pptx
+++ b/presentations/FakeNews_Final.pptx
@@ -5,7 +5,7 @@
     <p:sldMasterId id="2147483684" r:id="rId1"/>
   </p:sldMasterIdLst>
   <p:notesMasterIdLst>
-    <p:notesMasterId r:id="rId11"/>
+    <p:notesMasterId r:id="rId15"/>
   </p:notesMasterIdLst>
   <p:sldIdLst>
     <p:sldId id="267" r:id="rId2"/>
@@ -14,9 +14,13 @@
     <p:sldId id="261" r:id="rId5"/>
     <p:sldId id="266" r:id="rId6"/>
     <p:sldId id="264" r:id="rId7"/>
-    <p:sldId id="268" r:id="rId8"/>
-    <p:sldId id="263" r:id="rId9"/>
-    <p:sldId id="269" r:id="rId10"/>
+    <p:sldId id="270" r:id="rId8"/>
+    <p:sldId id="271" r:id="rId9"/>
+    <p:sldId id="272" r:id="rId10"/>
+    <p:sldId id="273" r:id="rId11"/>
+    <p:sldId id="268" r:id="rId12"/>
+    <p:sldId id="263" r:id="rId13"/>
+    <p:sldId id="269" r:id="rId14"/>
   </p:sldIdLst>
   <p:sldSz cx="12192000" cy="6858000"/>
   <p:notesSz cx="6858000" cy="9144000"/>
@@ -2848,8 +2852,8 @@
     <dgm:cxn modelId="{387B4FDC-D5EC-9E45-8F5E-F556FBFB902C}" type="presOf" srcId="{C19F11B3-C854-44C8-A59C-A1EF451F2948}" destId="{42ED8535-C8FE-FE42-A623-E4F45D46A6D3}" srcOrd="0" destOrd="0" presId="urn:microsoft.com/office/officeart/2005/8/layout/cycle5"/>
     <dgm:cxn modelId="{84AF1FE5-CFD9-5143-B62A-DEDFA9CBB1F8}" type="presOf" srcId="{CBAED0A8-8DDB-4FDE-8589-3F912D6A2477}" destId="{E9084C0B-7BFD-6749-842E-577D48DE41CB}" srcOrd="0" destOrd="0" presId="urn:microsoft.com/office/officeart/2005/8/layout/cycle5"/>
     <dgm:cxn modelId="{1083632F-1087-4B90-BCF1-A432A32A1ABE}" srcId="{5E5FC9A1-05B3-4CBB-AAEC-F359D4918CE0}" destId="{64FCFBF7-9AD8-4798-8455-502F023AD2E3}" srcOrd="2" destOrd="0" parTransId="{859C5D4B-E2F2-43A8-BEB7-9F06F33BAE1C}" sibTransId="{66DFF4A4-FE75-48DA-A534-8FCAA8407D7F}"/>
+    <dgm:cxn modelId="{52B16BEB-BDA8-403B-A4FD-7A38FF9DC72F}" srcId="{5E5FC9A1-05B3-4CBB-AAEC-F359D4918CE0}" destId="{D14A060B-9623-4DD7-A0B9-293E9249D056}" srcOrd="1" destOrd="0" parTransId="{13C3C016-7016-4808-B925-3DDD8055EA39}" sibTransId="{CBAED0A8-8DDB-4FDE-8589-3F912D6A2477}"/>
     <dgm:cxn modelId="{F8734188-6BDB-954D-9A99-353992B7AFCC}" type="presOf" srcId="{66DFF4A4-FE75-48DA-A534-8FCAA8407D7F}" destId="{797909E6-7BA6-D24E-A6BA-17AC177DA946}" srcOrd="0" destOrd="0" presId="urn:microsoft.com/office/officeart/2005/8/layout/cycle5"/>
-    <dgm:cxn modelId="{52B16BEB-BDA8-403B-A4FD-7A38FF9DC72F}" srcId="{5E5FC9A1-05B3-4CBB-AAEC-F359D4918CE0}" destId="{D14A060B-9623-4DD7-A0B9-293E9249D056}" srcOrd="1" destOrd="0" parTransId="{13C3C016-7016-4808-B925-3DDD8055EA39}" sibTransId="{CBAED0A8-8DDB-4FDE-8589-3F912D6A2477}"/>
     <dgm:cxn modelId="{516B9C8B-DFBD-A54A-877A-0D827257F29A}" type="presOf" srcId="{64FCFBF7-9AD8-4798-8455-502F023AD2E3}" destId="{97DA00DC-1283-254A-A19A-F3FCAEAC7299}" srcOrd="0" destOrd="0" presId="urn:microsoft.com/office/officeart/2005/8/layout/cycle5"/>
     <dgm:cxn modelId="{B86513F4-B470-4FDD-8258-2D5F1340F533}" srcId="{5E5FC9A1-05B3-4CBB-AAEC-F359D4918CE0}" destId="{0E855F10-898A-407F-BBB6-1C520FC2AAE9}" srcOrd="0" destOrd="0" parTransId="{BDBD4023-4572-4B9D-8A33-693CFC0D9725}" sibTransId="{C19F11B3-C854-44C8-A59C-A1EF451F2948}"/>
     <dgm:cxn modelId="{E6A432CC-75D6-F749-A4CF-9D62AFAD5E1D}" type="presParOf" srcId="{06BE4EE5-2FDF-174B-8D1B-0E65C4F18D7D}" destId="{417D50DA-53D7-B24A-ACE8-54D2755EF7EF}" srcOrd="0" destOrd="0" presId="urn:microsoft.com/office/officeart/2005/8/layout/cycle5"/>
@@ -3370,8 +3374,8 @@
     <dgm:cxn modelId="{F8D80906-A16D-094A-BB92-D241AAF2BF7B}" type="presOf" srcId="{C0C4AB79-55D0-4748-A837-8DCB3F511BCD}" destId="{1456FA7B-4421-1744-A2D4-1A5CFB92443D}" srcOrd="0" destOrd="2" presId="urn:microsoft.com/office/officeart/2005/8/layout/hChevron3"/>
     <dgm:cxn modelId="{0F046476-7DA5-DC44-8870-615994CD5036}" type="presOf" srcId="{CB7AE3A4-F843-4E6B-A39D-5BF54546D630}" destId="{1456FA7B-4421-1744-A2D4-1A5CFB92443D}" srcOrd="0" destOrd="0" presId="urn:microsoft.com/office/officeart/2005/8/layout/hChevron3"/>
     <dgm:cxn modelId="{42E588AC-35E6-47BC-BD14-4C344A30F470}" srcId="{5C9A1FAC-AC56-4EE6-A971-A1E188304E11}" destId="{0081E9BA-FDD8-4E66-9B33-79A7AA5C9E63}" srcOrd="1" destOrd="0" parTransId="{ECC97FF0-C9BE-44D8-A48A-7F250193C9F5}" sibTransId="{769B904B-B10D-4A93-BE1F-A5BBF2822923}"/>
+    <dgm:cxn modelId="{F725135C-FD03-0143-903F-40BD3A49E362}" type="presOf" srcId="{43A3B443-B2D1-452E-AB8E-60FCBD083143}" destId="{547D18C2-F374-9748-A1C5-1AA96CCF1B38}" srcOrd="0" destOrd="1" presId="urn:microsoft.com/office/officeart/2005/8/layout/hChevron3"/>
     <dgm:cxn modelId="{569AAF6E-6E58-6D48-AA51-845D83C9A116}" type="presOf" srcId="{59C40EFF-E339-4D86-A175-40692275845E}" destId="{1456FA7B-4421-1744-A2D4-1A5CFB92443D}" srcOrd="0" destOrd="3" presId="urn:microsoft.com/office/officeart/2005/8/layout/hChevron3"/>
-    <dgm:cxn modelId="{F725135C-FD03-0143-903F-40BD3A49E362}" type="presOf" srcId="{43A3B443-B2D1-452E-AB8E-60FCBD083143}" destId="{547D18C2-F374-9748-A1C5-1AA96CCF1B38}" srcOrd="0" destOrd="1" presId="urn:microsoft.com/office/officeart/2005/8/layout/hChevron3"/>
     <dgm:cxn modelId="{5BC1F5B3-A5E3-054C-859B-758CF7F4F8E1}" type="presOf" srcId="{5C9A1FAC-AC56-4EE6-A971-A1E188304E11}" destId="{0AE7F60A-16EC-BA4D-95CE-29335343A9FD}" srcOrd="0" destOrd="0" presId="urn:microsoft.com/office/officeart/2005/8/layout/hChevron3"/>
     <dgm:cxn modelId="{AA478E93-5579-6645-83BB-79590C326B84}" type="presOf" srcId="{0081E9BA-FDD8-4E66-9B33-79A7AA5C9E63}" destId="{0AE7F60A-16EC-BA4D-95CE-29335343A9FD}" srcOrd="0" destOrd="2" presId="urn:microsoft.com/office/officeart/2005/8/layout/hChevron3"/>
     <dgm:cxn modelId="{E91BC478-E1EE-FF42-B522-9E8F287D45AD}" type="presOf" srcId="{74B238E8-CB71-497E-8415-6D61B9E5CCEC}" destId="{0AE7F60A-16EC-BA4D-95CE-29335343A9FD}" srcOrd="0" destOrd="1" presId="urn:microsoft.com/office/officeart/2005/8/layout/hChevron3"/>
@@ -3901,8 +3905,8 @@
     <dgm:cxn modelId="{4A2A0F31-63E7-4BFD-9C38-49C65501ED2D}" srcId="{C8AD1EE5-C11D-4FC7-AAEA-A953F38196E5}" destId="{478DE50D-FF8B-425C-92CF-D8732542AC06}" srcOrd="3" destOrd="0" parTransId="{101D1BE1-2D0F-4D77-B66D-8E2267A4520F}" sibTransId="{4683CA80-D1B3-4173-B718-7DC822EF00DA}"/>
     <dgm:cxn modelId="{02733F1F-E9A7-6140-A4AE-7F3033440799}" type="presOf" srcId="{BDC49A55-58E0-46A0-BD7F-BE3D82168B86}" destId="{FB2D7F55-9E12-F849-AFBF-B606A55FABCA}" srcOrd="1" destOrd="0" presId="urn:microsoft.com/office/officeart/2016/7/layout/LinearBlockProcessNumbered"/>
     <dgm:cxn modelId="{F3F88643-E63D-4A43-9F84-1E7241EE55BF}" type="presOf" srcId="{478DE50D-FF8B-425C-92CF-D8732542AC06}" destId="{DB34842A-9F97-B548-83B9-3F114A8ACA08}" srcOrd="0" destOrd="0" presId="urn:microsoft.com/office/officeart/2016/7/layout/LinearBlockProcessNumbered"/>
+    <dgm:cxn modelId="{37E2C2E3-56F0-014B-BD66-43E8ABD67CF5}" type="presOf" srcId="{C8AD1EE5-C11D-4FC7-AAEA-A953F38196E5}" destId="{9016E202-E81A-CD41-907D-C56A6B19D5DC}" srcOrd="0" destOrd="0" presId="urn:microsoft.com/office/officeart/2016/7/layout/LinearBlockProcessNumbered"/>
     <dgm:cxn modelId="{23BB42C0-CAC2-F046-9B39-E739317EBBB8}" type="presOf" srcId="{77AAA2AD-908C-49A0-B53A-264BE57A570C}" destId="{4D0308FE-5E5D-9442-9568-7603FDB9010C}" srcOrd="1" destOrd="0" presId="urn:microsoft.com/office/officeart/2016/7/layout/LinearBlockProcessNumbered"/>
-    <dgm:cxn modelId="{37E2C2E3-56F0-014B-BD66-43E8ABD67CF5}" type="presOf" srcId="{C8AD1EE5-C11D-4FC7-AAEA-A953F38196E5}" destId="{9016E202-E81A-CD41-907D-C56A6B19D5DC}" srcOrd="0" destOrd="0" presId="urn:microsoft.com/office/officeart/2016/7/layout/LinearBlockProcessNumbered"/>
     <dgm:cxn modelId="{755C0723-4150-074C-B803-AFBE8679B3D8}" type="presOf" srcId="{FD714428-E82D-42E4-A901-3D96C42A01EA}" destId="{356670F5-7DD9-134E-8841-105E332C2A28}" srcOrd="0" destOrd="0" presId="urn:microsoft.com/office/officeart/2016/7/layout/LinearBlockProcessNumbered"/>
     <dgm:cxn modelId="{58A4D6C6-B8F6-AA47-8F64-AAB3210232AA}" type="presOf" srcId="{4683CA80-D1B3-4173-B718-7DC822EF00DA}" destId="{8626C7D8-B488-7847-9AAA-D19B77B20972}" srcOrd="0" destOrd="0" presId="urn:microsoft.com/office/officeart/2016/7/layout/LinearBlockProcessNumbered"/>
     <dgm:cxn modelId="{975E1F0E-3E05-4929-8E63-65A3D0D77F5F}" srcId="{C8AD1EE5-C11D-4FC7-AAEA-A953F38196E5}" destId="{BDC49A55-58E0-46A0-BD7F-BE3D82168B86}" srcOrd="1" destOrd="0" parTransId="{2EA34A99-F3D1-43B2-AA59-5CA7A721E620}" sibTransId="{0CBB45A4-703E-417E-BBD3-C23487BA3A2C}"/>
@@ -6546,7 +6550,7 @@
   </dgm:layoutNode>
   <dgm:extLst>
     <a:ext uri="{4F341089-5ED1-44EC-B178-C955D00A3D55}">
-      <dgm1611:autoBuNodeInfoLst xmlns:dgm1611="http://schemas.microsoft.com/office/drawing/2016/11/diagram" xmlns="">
+      <dgm1611:autoBuNodeInfoLst xmlns="" xmlns:dgm1611="http://schemas.microsoft.com/office/drawing/2016/11/diagram">
         <dgm1611:autoBuNodeInfo lvl="1" ptType="sibTrans">
           <dgm1611:buPr prefix="" leadZeros="1">
             <a:buAutoNum type="arabicParenBoth"/>
@@ -13770,6 +13774,859 @@
               <a:rPr lang="en-US" dirty="0"/>
               <a:t>CS5100 Fall 2017</a:t>
             </a:r>
+          </a:p>
+        </p:txBody>
+      </p:sp>
+    </p:spTree>
+    <p:extLst>
+      <p:ext uri="{BB962C8B-B14F-4D97-AF65-F5344CB8AC3E}">
+        <p14:creationId xmlns:p14="http://schemas.microsoft.com/office/powerpoint/2010/main" val="1927784821"/>
+      </p:ext>
+    </p:extLst>
+  </p:cSld>
+  <p:clrMapOvr>
+    <a:masterClrMapping/>
+  </p:clrMapOvr>
+</p:sld>
+</file>
+
+<file path=ppt/slides/slide10.xml><?xml version="1.0" encoding="utf-8"?>
+<p:sld xmlns:a="http://schemas.openxmlformats.org/drawingml/2006/main" xmlns:r="http://schemas.openxmlformats.org/officeDocument/2006/relationships" xmlns:p="http://schemas.openxmlformats.org/presentationml/2006/main">
+  <p:cSld>
+    <p:spTree>
+      <p:nvGrpSpPr>
+        <p:cNvPr id="1" name=""/>
+        <p:cNvGrpSpPr/>
+        <p:nvPr/>
+      </p:nvGrpSpPr>
+      <p:grpSpPr>
+        <a:xfrm>
+          <a:off x="0" y="0"/>
+          <a:ext cx="0" cy="0"/>
+          <a:chOff x="0" y="0"/>
+          <a:chExt cx="0" cy="0"/>
+        </a:xfrm>
+      </p:grpSpPr>
+      <p:sp>
+        <p:nvSpPr>
+          <p:cNvPr id="2" name="Title 1"/>
+          <p:cNvSpPr>
+            <a:spLocks noGrp="1"/>
+          </p:cNvSpPr>
+          <p:nvPr>
+            <p:ph type="title"/>
+          </p:nvPr>
+        </p:nvSpPr>
+        <p:spPr/>
+        <p:txBody>
+          <a:bodyPr/>
+          <a:lstStyle/>
+          <a:p>
+            <a:r>
+              <a:rPr lang="en-US" dirty="0" smtClean="0"/>
+              <a:t>Working on the matrix!</a:t>
+            </a:r>
+            <a:endParaRPr lang="en-US" dirty="0"/>
+          </a:p>
+        </p:txBody>
+      </p:sp>
+      <p:graphicFrame>
+        <p:nvGraphicFramePr>
+          <p:cNvPr id="8" name="Table 7"/>
+          <p:cNvGraphicFramePr>
+            <a:graphicFrameLocks noGrp="1"/>
+          </p:cNvGraphicFramePr>
+          <p:nvPr/>
+        </p:nvGraphicFramePr>
+        <p:xfrm>
+          <a:off x="5486398" y="2171700"/>
+          <a:ext cx="4926695" cy="2465616"/>
+        </p:xfrm>
+        <a:graphic>
+          <a:graphicData uri="http://schemas.openxmlformats.org/drawingml/2006/table">
+            <a:tbl>
+              <a:tblPr>
+                <a:tableStyleId>{5C22544A-7EE6-4342-B048-85BDC9FD1C3A}</a:tableStyleId>
+              </a:tblPr>
+              <a:tblGrid>
+                <a:gridCol w="985339"/>
+                <a:gridCol w="985339"/>
+                <a:gridCol w="985339"/>
+                <a:gridCol w="985339"/>
+                <a:gridCol w="985339"/>
+              </a:tblGrid>
+              <a:tr h="616404">
+                <a:tc>
+                  <a:txBody>
+                    <a:bodyPr/>
+                    <a:lstStyle/>
+                    <a:p>
+                      <a:pPr algn="ctr" fontAlgn="b"/>
+                      <a:r>
+                        <a:rPr lang="mr-IN" sz="1200" u="none" strike="noStrike">
+                          <a:effectLst/>
+                        </a:rPr>
+                        <a:t>f(w1, d1)</a:t>
+                      </a:r>
+                      <a:endParaRPr lang="mr-IN" sz="1200" b="0" i="0" u="none" strike="noStrike">
+                        <a:solidFill>
+                          <a:srgbClr val="000000"/>
+                        </a:solidFill>
+                        <a:effectLst/>
+                        <a:latin typeface="Calibri" charset="0"/>
+                      </a:endParaRPr>
+                    </a:p>
+                  </a:txBody>
+                  <a:tcPr marL="6350" marR="6350" marT="6350" marB="0" anchor="b"/>
+                </a:tc>
+                <a:tc>
+                  <a:txBody>
+                    <a:bodyPr/>
+                    <a:lstStyle/>
+                    <a:p>
+                      <a:pPr algn="ctr" fontAlgn="b"/>
+                      <a:r>
+                        <a:rPr lang="mr-IN" sz="1200" u="none" strike="noStrike">
+                          <a:effectLst/>
+                        </a:rPr>
+                        <a:t>f(w2, d1)</a:t>
+                      </a:r>
+                      <a:endParaRPr lang="mr-IN" sz="1200" b="0" i="0" u="none" strike="noStrike">
+                        <a:solidFill>
+                          <a:srgbClr val="000000"/>
+                        </a:solidFill>
+                        <a:effectLst/>
+                        <a:latin typeface="Calibri" charset="0"/>
+                      </a:endParaRPr>
+                    </a:p>
+                  </a:txBody>
+                  <a:tcPr marL="6350" marR="6350" marT="6350" marB="0" anchor="b"/>
+                </a:tc>
+                <a:tc>
+                  <a:txBody>
+                    <a:bodyPr/>
+                    <a:lstStyle/>
+                    <a:p>
+                      <a:pPr algn="ctr" fontAlgn="b"/>
+                      <a:r>
+                        <a:rPr lang="mr-IN" sz="1200" u="none" strike="noStrike">
+                          <a:effectLst/>
+                        </a:rPr>
+                        <a:t>f(w3, d1)</a:t>
+                      </a:r>
+                      <a:endParaRPr lang="mr-IN" sz="1200" b="0" i="0" u="none" strike="noStrike">
+                        <a:solidFill>
+                          <a:srgbClr val="000000"/>
+                        </a:solidFill>
+                        <a:effectLst/>
+                        <a:latin typeface="Calibri" charset="0"/>
+                      </a:endParaRPr>
+                    </a:p>
+                  </a:txBody>
+                  <a:tcPr marL="6350" marR="6350" marT="6350" marB="0" anchor="b"/>
+                </a:tc>
+                <a:tc>
+                  <a:txBody>
+                    <a:bodyPr/>
+                    <a:lstStyle/>
+                    <a:p>
+                      <a:pPr algn="ctr" fontAlgn="b"/>
+                      <a:r>
+                        <a:rPr lang="mr-IN" sz="1200" u="none" strike="noStrike">
+                          <a:effectLst/>
+                        </a:rPr>
+                        <a:t>…</a:t>
+                      </a:r>
+                      <a:endParaRPr lang="mr-IN" sz="1200" b="0" i="0" u="none" strike="noStrike">
+                        <a:solidFill>
+                          <a:srgbClr val="000000"/>
+                        </a:solidFill>
+                        <a:effectLst/>
+                        <a:latin typeface="Calibri" charset="0"/>
+                      </a:endParaRPr>
+                    </a:p>
+                  </a:txBody>
+                  <a:tcPr marL="6350" marR="6350" marT="6350" marB="0" anchor="b"/>
+                </a:tc>
+                <a:tc>
+                  <a:txBody>
+                    <a:bodyPr/>
+                    <a:lstStyle/>
+                    <a:p>
+                      <a:pPr algn="ctr" fontAlgn="b"/>
+                      <a:r>
+                        <a:rPr lang="en-US" sz="1200" u="none" strike="noStrike">
+                          <a:effectLst/>
+                        </a:rPr>
+                        <a:t>f(wn, d1)</a:t>
+                      </a:r>
+                      <a:endParaRPr lang="en-US" sz="1200" b="0" i="0" u="none" strike="noStrike">
+                        <a:solidFill>
+                          <a:srgbClr val="000000"/>
+                        </a:solidFill>
+                        <a:effectLst/>
+                        <a:latin typeface="Calibri" charset="0"/>
+                      </a:endParaRPr>
+                    </a:p>
+                  </a:txBody>
+                  <a:tcPr marL="6350" marR="6350" marT="6350" marB="0" anchor="b"/>
+                </a:tc>
+              </a:tr>
+              <a:tr h="616404">
+                <a:tc>
+                  <a:txBody>
+                    <a:bodyPr/>
+                    <a:lstStyle/>
+                    <a:p>
+                      <a:pPr algn="ctr" fontAlgn="b"/>
+                      <a:r>
+                        <a:rPr lang="mr-IN" sz="1200" u="none" strike="noStrike">
+                          <a:effectLst/>
+                        </a:rPr>
+                        <a:t>f(w1, d2)</a:t>
+                      </a:r>
+                      <a:endParaRPr lang="mr-IN" sz="1200" b="0" i="0" u="none" strike="noStrike">
+                        <a:solidFill>
+                          <a:srgbClr val="000000"/>
+                        </a:solidFill>
+                        <a:effectLst/>
+                        <a:latin typeface="Calibri" charset="0"/>
+                      </a:endParaRPr>
+                    </a:p>
+                  </a:txBody>
+                  <a:tcPr marL="6350" marR="6350" marT="6350" marB="0" anchor="b"/>
+                </a:tc>
+                <a:tc>
+                  <a:txBody>
+                    <a:bodyPr/>
+                    <a:lstStyle/>
+                    <a:p>
+                      <a:pPr algn="ctr" fontAlgn="b"/>
+                      <a:r>
+                        <a:rPr lang="mr-IN" sz="1200" u="none" strike="noStrike">
+                          <a:effectLst/>
+                        </a:rPr>
+                        <a:t>…</a:t>
+                      </a:r>
+                      <a:endParaRPr lang="mr-IN" sz="1200" b="0" i="0" u="none" strike="noStrike">
+                        <a:solidFill>
+                          <a:srgbClr val="000000"/>
+                        </a:solidFill>
+                        <a:effectLst/>
+                        <a:latin typeface="Calibri" charset="0"/>
+                      </a:endParaRPr>
+                    </a:p>
+                  </a:txBody>
+                  <a:tcPr marL="6350" marR="6350" marT="6350" marB="0" anchor="b"/>
+                </a:tc>
+                <a:tc>
+                  <a:txBody>
+                    <a:bodyPr/>
+                    <a:lstStyle/>
+                    <a:p>
+                      <a:pPr algn="ctr" fontAlgn="b"/>
+                      <a:r>
+                        <a:rPr lang="mr-IN" sz="1200" u="none" strike="noStrike" dirty="0">
+                          <a:effectLst/>
+                        </a:rPr>
+                        <a:t>…</a:t>
+                      </a:r>
+                      <a:endParaRPr lang="mr-IN" sz="1200" b="0" i="0" u="none" strike="noStrike" dirty="0">
+                        <a:solidFill>
+                          <a:srgbClr val="000000"/>
+                        </a:solidFill>
+                        <a:effectLst/>
+                        <a:latin typeface="Calibri" charset="0"/>
+                      </a:endParaRPr>
+                    </a:p>
+                  </a:txBody>
+                  <a:tcPr marL="6350" marR="6350" marT="6350" marB="0" anchor="b"/>
+                </a:tc>
+                <a:tc>
+                  <a:txBody>
+                    <a:bodyPr/>
+                    <a:lstStyle/>
+                    <a:p>
+                      <a:pPr algn="ctr" fontAlgn="b"/>
+                      <a:r>
+                        <a:rPr lang="mr-IN" sz="1200" u="none" strike="noStrike">
+                          <a:effectLst/>
+                        </a:rPr>
+                        <a:t>…</a:t>
+                      </a:r>
+                      <a:endParaRPr lang="mr-IN" sz="1200" b="0" i="0" u="none" strike="noStrike">
+                        <a:solidFill>
+                          <a:srgbClr val="000000"/>
+                        </a:solidFill>
+                        <a:effectLst/>
+                        <a:latin typeface="Calibri" charset="0"/>
+                      </a:endParaRPr>
+                    </a:p>
+                  </a:txBody>
+                  <a:tcPr marL="6350" marR="6350" marT="6350" marB="0" anchor="b"/>
+                </a:tc>
+                <a:tc>
+                  <a:txBody>
+                    <a:bodyPr/>
+                    <a:lstStyle/>
+                    <a:p>
+                      <a:pPr algn="ctr" fontAlgn="b"/>
+                      <a:r>
+                        <a:rPr lang="mr-IN" sz="1200" u="none" strike="noStrike">
+                          <a:effectLst/>
+                        </a:rPr>
+                        <a:t>…</a:t>
+                      </a:r>
+                      <a:endParaRPr lang="mr-IN" sz="1200" b="0" i="0" u="none" strike="noStrike">
+                        <a:solidFill>
+                          <a:srgbClr val="000000"/>
+                        </a:solidFill>
+                        <a:effectLst/>
+                        <a:latin typeface="Calibri" charset="0"/>
+                      </a:endParaRPr>
+                    </a:p>
+                  </a:txBody>
+                  <a:tcPr marL="6350" marR="6350" marT="6350" marB="0" anchor="b"/>
+                </a:tc>
+              </a:tr>
+              <a:tr h="616404">
+                <a:tc>
+                  <a:txBody>
+                    <a:bodyPr/>
+                    <a:lstStyle/>
+                    <a:p>
+                      <a:pPr algn="ctr" fontAlgn="b"/>
+                      <a:r>
+                        <a:rPr lang="mr-IN" sz="1200" u="none" strike="noStrike">
+                          <a:effectLst/>
+                        </a:rPr>
+                        <a:t>…</a:t>
+                      </a:r>
+                      <a:endParaRPr lang="mr-IN" sz="1200" b="0" i="0" u="none" strike="noStrike">
+                        <a:solidFill>
+                          <a:srgbClr val="000000"/>
+                        </a:solidFill>
+                        <a:effectLst/>
+                        <a:latin typeface="Calibri" charset="0"/>
+                      </a:endParaRPr>
+                    </a:p>
+                  </a:txBody>
+                  <a:tcPr marL="6350" marR="6350" marT="6350" marB="0" anchor="b"/>
+                </a:tc>
+                <a:tc>
+                  <a:txBody>
+                    <a:bodyPr/>
+                    <a:lstStyle/>
+                    <a:p>
+                      <a:pPr algn="ctr" fontAlgn="b"/>
+                      <a:r>
+                        <a:rPr lang="mr-IN" sz="1200" u="none" strike="noStrike">
+                          <a:effectLst/>
+                        </a:rPr>
+                        <a:t>…</a:t>
+                      </a:r>
+                      <a:endParaRPr lang="mr-IN" sz="1200" b="0" i="0" u="none" strike="noStrike">
+                        <a:solidFill>
+                          <a:srgbClr val="000000"/>
+                        </a:solidFill>
+                        <a:effectLst/>
+                        <a:latin typeface="Calibri" charset="0"/>
+                      </a:endParaRPr>
+                    </a:p>
+                  </a:txBody>
+                  <a:tcPr marL="6350" marR="6350" marT="6350" marB="0" anchor="b"/>
+                </a:tc>
+                <a:tc>
+                  <a:txBody>
+                    <a:bodyPr/>
+                    <a:lstStyle/>
+                    <a:p>
+                      <a:pPr algn="ctr" fontAlgn="b"/>
+                      <a:r>
+                        <a:rPr lang="mr-IN" sz="1200" u="none" strike="noStrike">
+                          <a:effectLst/>
+                        </a:rPr>
+                        <a:t>…</a:t>
+                      </a:r>
+                      <a:endParaRPr lang="mr-IN" sz="1200" b="0" i="0" u="none" strike="noStrike">
+                        <a:solidFill>
+                          <a:srgbClr val="000000"/>
+                        </a:solidFill>
+                        <a:effectLst/>
+                        <a:latin typeface="Calibri" charset="0"/>
+                      </a:endParaRPr>
+                    </a:p>
+                  </a:txBody>
+                  <a:tcPr marL="6350" marR="6350" marT="6350" marB="0" anchor="b"/>
+                </a:tc>
+                <a:tc>
+                  <a:txBody>
+                    <a:bodyPr/>
+                    <a:lstStyle/>
+                    <a:p>
+                      <a:pPr algn="ctr" fontAlgn="b"/>
+                      <a:r>
+                        <a:rPr lang="mr-IN" sz="1200" u="none" strike="noStrike">
+                          <a:effectLst/>
+                        </a:rPr>
+                        <a:t>…</a:t>
+                      </a:r>
+                      <a:endParaRPr lang="mr-IN" sz="1200" b="0" i="0" u="none" strike="noStrike">
+                        <a:solidFill>
+                          <a:srgbClr val="000000"/>
+                        </a:solidFill>
+                        <a:effectLst/>
+                        <a:latin typeface="Calibri" charset="0"/>
+                      </a:endParaRPr>
+                    </a:p>
+                  </a:txBody>
+                  <a:tcPr marL="6350" marR="6350" marT="6350" marB="0" anchor="b"/>
+                </a:tc>
+                <a:tc>
+                  <a:txBody>
+                    <a:bodyPr/>
+                    <a:lstStyle/>
+                    <a:p>
+                      <a:pPr algn="ctr" fontAlgn="b"/>
+                      <a:r>
+                        <a:rPr lang="mr-IN" sz="1200" u="none" strike="noStrike">
+                          <a:effectLst/>
+                        </a:rPr>
+                        <a:t>…</a:t>
+                      </a:r>
+                      <a:endParaRPr lang="mr-IN" sz="1200" b="0" i="0" u="none" strike="noStrike">
+                        <a:solidFill>
+                          <a:srgbClr val="000000"/>
+                        </a:solidFill>
+                        <a:effectLst/>
+                        <a:latin typeface="Calibri" charset="0"/>
+                      </a:endParaRPr>
+                    </a:p>
+                  </a:txBody>
+                  <a:tcPr marL="6350" marR="6350" marT="6350" marB="0" anchor="b"/>
+                </a:tc>
+              </a:tr>
+              <a:tr h="616404">
+                <a:tc>
+                  <a:txBody>
+                    <a:bodyPr/>
+                    <a:lstStyle/>
+                    <a:p>
+                      <a:pPr algn="ctr" fontAlgn="b"/>
+                      <a:r>
+                        <a:rPr lang="mr-IN" sz="1200" u="none" strike="noStrike">
+                          <a:effectLst/>
+                        </a:rPr>
+                        <a:t>f(w1, dm)</a:t>
+                      </a:r>
+                      <a:endParaRPr lang="mr-IN" sz="1200" b="0" i="0" u="none" strike="noStrike">
+                        <a:solidFill>
+                          <a:srgbClr val="000000"/>
+                        </a:solidFill>
+                        <a:effectLst/>
+                        <a:latin typeface="Calibri" charset="0"/>
+                      </a:endParaRPr>
+                    </a:p>
+                  </a:txBody>
+                  <a:tcPr marL="6350" marR="6350" marT="6350" marB="0" anchor="b"/>
+                </a:tc>
+                <a:tc>
+                  <a:txBody>
+                    <a:bodyPr/>
+                    <a:lstStyle/>
+                    <a:p>
+                      <a:pPr algn="ctr" fontAlgn="b"/>
+                      <a:r>
+                        <a:rPr lang="mr-IN" sz="1200" u="none" strike="noStrike">
+                          <a:effectLst/>
+                        </a:rPr>
+                        <a:t>…</a:t>
+                      </a:r>
+                      <a:endParaRPr lang="mr-IN" sz="1200" b="0" i="0" u="none" strike="noStrike">
+                        <a:solidFill>
+                          <a:srgbClr val="000000"/>
+                        </a:solidFill>
+                        <a:effectLst/>
+                        <a:latin typeface="Calibri" charset="0"/>
+                      </a:endParaRPr>
+                    </a:p>
+                  </a:txBody>
+                  <a:tcPr marL="6350" marR="6350" marT="6350" marB="0" anchor="b"/>
+                </a:tc>
+                <a:tc>
+                  <a:txBody>
+                    <a:bodyPr/>
+                    <a:lstStyle/>
+                    <a:p>
+                      <a:pPr algn="ctr" fontAlgn="b"/>
+                      <a:r>
+                        <a:rPr lang="mr-IN" sz="1200" u="none" strike="noStrike">
+                          <a:effectLst/>
+                        </a:rPr>
+                        <a:t>…</a:t>
+                      </a:r>
+                      <a:endParaRPr lang="mr-IN" sz="1200" b="0" i="0" u="none" strike="noStrike">
+                        <a:solidFill>
+                          <a:srgbClr val="000000"/>
+                        </a:solidFill>
+                        <a:effectLst/>
+                        <a:latin typeface="Calibri" charset="0"/>
+                      </a:endParaRPr>
+                    </a:p>
+                  </a:txBody>
+                  <a:tcPr marL="6350" marR="6350" marT="6350" marB="0" anchor="b"/>
+                </a:tc>
+                <a:tc>
+                  <a:txBody>
+                    <a:bodyPr/>
+                    <a:lstStyle/>
+                    <a:p>
+                      <a:pPr algn="ctr" fontAlgn="b"/>
+                      <a:r>
+                        <a:rPr lang="mr-IN" sz="1200" u="none" strike="noStrike">
+                          <a:effectLst/>
+                        </a:rPr>
+                        <a:t>…</a:t>
+                      </a:r>
+                      <a:endParaRPr lang="mr-IN" sz="1200" b="0" i="0" u="none" strike="noStrike">
+                        <a:solidFill>
+                          <a:srgbClr val="000000"/>
+                        </a:solidFill>
+                        <a:effectLst/>
+                        <a:latin typeface="Calibri" charset="0"/>
+                      </a:endParaRPr>
+                    </a:p>
+                  </a:txBody>
+                  <a:tcPr marL="6350" marR="6350" marT="6350" marB="0" anchor="b"/>
+                </a:tc>
+                <a:tc>
+                  <a:txBody>
+                    <a:bodyPr/>
+                    <a:lstStyle/>
+                    <a:p>
+                      <a:pPr algn="ctr" fontAlgn="b"/>
+                      <a:r>
+                        <a:rPr lang="mr-IN" sz="1200" u="none" strike="noStrike" dirty="0" err="1">
+                          <a:effectLst/>
+                        </a:rPr>
+                        <a:t>f</a:t>
+                      </a:r>
+                      <a:r>
+                        <a:rPr lang="mr-IN" sz="1200" u="none" strike="noStrike" dirty="0">
+                          <a:effectLst/>
+                        </a:rPr>
+                        <a:t>(</a:t>
+                      </a:r>
+                      <a:r>
+                        <a:rPr lang="mr-IN" sz="1200" u="none" strike="noStrike" dirty="0" err="1">
+                          <a:effectLst/>
+                        </a:rPr>
+                        <a:t>wn</a:t>
+                      </a:r>
+                      <a:r>
+                        <a:rPr lang="mr-IN" sz="1200" u="none" strike="noStrike" dirty="0">
+                          <a:effectLst/>
+                        </a:rPr>
+                        <a:t>, </a:t>
+                      </a:r>
+                      <a:r>
+                        <a:rPr lang="mr-IN" sz="1200" u="none" strike="noStrike" dirty="0" err="1">
+                          <a:effectLst/>
+                        </a:rPr>
+                        <a:t>dm</a:t>
+                      </a:r>
+                      <a:r>
+                        <a:rPr lang="mr-IN" sz="1200" u="none" strike="noStrike" dirty="0">
+                          <a:effectLst/>
+                        </a:rPr>
+                        <a:t>)</a:t>
+                      </a:r>
+                      <a:endParaRPr lang="mr-IN" sz="1200" b="0" i="0" u="none" strike="noStrike" dirty="0">
+                        <a:solidFill>
+                          <a:srgbClr val="000000"/>
+                        </a:solidFill>
+                        <a:effectLst/>
+                        <a:latin typeface="Calibri" charset="0"/>
+                      </a:endParaRPr>
+                    </a:p>
+                  </a:txBody>
+                  <a:tcPr marL="6350" marR="6350" marT="6350" marB="0" anchor="b"/>
+                </a:tc>
+              </a:tr>
+            </a:tbl>
+          </a:graphicData>
+        </a:graphic>
+      </p:graphicFrame>
+      <p:sp>
+        <p:nvSpPr>
+          <p:cNvPr id="9" name="TextBox 8"/>
+          <p:cNvSpPr txBox="1"/>
+          <p:nvPr/>
+        </p:nvSpPr>
+        <p:spPr>
+          <a:xfrm>
+            <a:off x="1325878" y="2171700"/>
+            <a:ext cx="4160520" cy="3693319"/>
+          </a:xfrm>
+          <a:prstGeom prst="rect">
+            <a:avLst/>
+          </a:prstGeom>
+          <a:noFill/>
+        </p:spPr>
+        <p:txBody>
+          <a:bodyPr wrap="square" rtlCol="0">
+            <a:spAutoFit/>
+          </a:bodyPr>
+          <a:lstStyle/>
+          <a:p>
+            <a:r>
+              <a:rPr lang="en-US" b="1" dirty="0" smtClean="0"/>
+              <a:t>Steps:</a:t>
+            </a:r>
+          </a:p>
+          <a:p>
+            <a:endParaRPr lang="en-US" dirty="0"/>
+          </a:p>
+          <a:p>
+            <a:pPr marL="285750" indent="-285750">
+              <a:buFont typeface="Arial" charset="0"/>
+              <a:buChar char="•"/>
+            </a:pPr>
+            <a:r>
+              <a:rPr lang="en-US" dirty="0" smtClean="0"/>
+              <a:t>Counting term frequency:</a:t>
+            </a:r>
+          </a:p>
+          <a:p>
+            <a:pPr marL="742950" lvl="1" indent="-285750">
+              <a:buFont typeface="Courier New" charset="0"/>
+              <a:buChar char="o"/>
+            </a:pPr>
+            <a:r>
+              <a:rPr lang="en-US" dirty="0" smtClean="0"/>
+              <a:t>Boolean counting, naïve counting, log counting</a:t>
+            </a:r>
+          </a:p>
+          <a:p>
+            <a:pPr marL="742950" lvl="1" indent="-285750">
+              <a:buFont typeface="Courier New" charset="0"/>
+              <a:buChar char="o"/>
+            </a:pPr>
+            <a:endParaRPr lang="en-US" dirty="0" smtClean="0"/>
+          </a:p>
+          <a:p>
+            <a:pPr marL="285750" indent="-285750">
+              <a:buFont typeface="Arial" charset="0"/>
+              <a:buChar char="•"/>
+            </a:pPr>
+            <a:r>
+              <a:rPr lang="en-US" dirty="0" smtClean="0"/>
+              <a:t>Inverse-document frequency</a:t>
+            </a:r>
+          </a:p>
+          <a:p>
+            <a:pPr marL="285750" indent="-285750">
+              <a:buFont typeface="Arial" charset="0"/>
+              <a:buChar char="•"/>
+            </a:pPr>
+            <a:endParaRPr lang="en-US" dirty="0"/>
+          </a:p>
+          <a:p>
+            <a:endParaRPr lang="en-US" dirty="0"/>
+          </a:p>
+          <a:p>
+            <a:pPr marL="285750" indent="-285750">
+              <a:buFont typeface="Arial" charset="0"/>
+              <a:buChar char="•"/>
+            </a:pPr>
+            <a:r>
+              <a:rPr lang="en-US" dirty="0" smtClean="0"/>
+              <a:t>Normalization:</a:t>
+            </a:r>
+          </a:p>
+          <a:p>
+            <a:pPr marL="742950" lvl="1" indent="-285750">
+              <a:buFont typeface="Arial" charset="0"/>
+              <a:buChar char="•"/>
+            </a:pPr>
+            <a:r>
+              <a:rPr lang="en-US" dirty="0" smtClean="0"/>
+              <a:t>To avoid cases like</a:t>
+            </a:r>
+          </a:p>
+          <a:p>
+            <a:pPr marL="742950" lvl="1" indent="-285750">
+              <a:buFont typeface="Arial" charset="0"/>
+              <a:buChar char="•"/>
+            </a:pPr>
+            <a:r>
+              <a:rPr lang="en-US" smtClean="0"/>
+              <a:t>[12, 0, 32] --&gt;  [.62, 0, .92]</a:t>
+            </a:r>
+          </a:p>
+          <a:p>
+            <a:pPr marL="285750" indent="-285750">
+              <a:buFont typeface="Arial" charset="0"/>
+              <a:buChar char="•"/>
+            </a:pPr>
+            <a:r>
+              <a:rPr lang="en-US" dirty="0" smtClean="0"/>
+              <a:t>TF * IDF gives us a balanced matrix!</a:t>
+            </a:r>
+            <a:endParaRPr lang="en-US" dirty="0"/>
+          </a:p>
+        </p:txBody>
+      </p:sp>
+      <p:pic>
+        <p:nvPicPr>
+          <p:cNvPr id="4098" name="Picture 2" descr="quation.pdf"/>
+          <p:cNvPicPr>
+            <a:picLocks noChangeAspect="1" noChangeArrowheads="1"/>
+          </p:cNvPicPr>
+          <p:nvPr/>
+        </p:nvPicPr>
+        <p:blipFill>
+          <a:blip r:embed="rId2">
+            <a:extLst>
+              <a:ext uri="{28A0092B-C50C-407E-A947-70E740481C1C}">
+                <a14:useLocalDpi xmlns:a14="http://schemas.microsoft.com/office/drawing/2010/main" val="0"/>
+              </a:ext>
+            </a:extLst>
+          </a:blip>
+          <a:srcRect/>
+          <a:stretch>
+            <a:fillRect/>
+          </a:stretch>
+        </p:blipFill>
+        <p:spPr bwMode="auto">
+          <a:xfrm>
+            <a:off x="2358388" y="3657599"/>
+            <a:ext cx="3113784" cy="226457"/>
+          </a:xfrm>
+          <a:prstGeom prst="rect">
+            <a:avLst/>
+          </a:prstGeom>
+          <a:noFill/>
+          <a:extLst>
+            <a:ext uri="{909E8E84-426E-40DD-AFC4-6F175D3DCCD1}">
+              <a14:hiddenFill xmlns:a14="http://schemas.microsoft.com/office/drawing/2010/main">
+                <a:solidFill>
+                  <a:srgbClr val="FFFFFF"/>
+                </a:solidFill>
+              </a14:hiddenFill>
+            </a:ext>
+          </a:extLst>
+        </p:spPr>
+      </p:pic>
+      <p:pic>
+        <p:nvPicPr>
+          <p:cNvPr id="4100" name="Picture 4" descr="quation.pdf"/>
+          <p:cNvPicPr>
+            <a:picLocks noChangeAspect="1" noChangeArrowheads="1"/>
+          </p:cNvPicPr>
+          <p:nvPr/>
+        </p:nvPicPr>
+        <p:blipFill>
+          <a:blip r:embed="rId3">
+            <a:extLst>
+              <a:ext uri="{28A0092B-C50C-407E-A947-70E740481C1C}">
+                <a14:useLocalDpi xmlns:a14="http://schemas.microsoft.com/office/drawing/2010/main" val="0"/>
+              </a:ext>
+            </a:extLst>
+          </a:blip>
+          <a:srcRect/>
+          <a:stretch>
+            <a:fillRect/>
+          </a:stretch>
+        </p:blipFill>
+        <p:spPr bwMode="auto">
+          <a:xfrm>
+            <a:off x="2358388" y="4244339"/>
+            <a:ext cx="3143868" cy="229689"/>
+          </a:xfrm>
+          <a:prstGeom prst="rect">
+            <a:avLst/>
+          </a:prstGeom>
+          <a:noFill/>
+          <a:extLst>
+            <a:ext uri="{909E8E84-426E-40DD-AFC4-6F175D3DCCD1}">
+              <a14:hiddenFill xmlns:a14="http://schemas.microsoft.com/office/drawing/2010/main">
+                <a:solidFill>
+                  <a:srgbClr val="FFFFFF"/>
+                </a:solidFill>
+              </a14:hiddenFill>
+            </a:ext>
+          </a:extLst>
+        </p:spPr>
+      </p:pic>
+    </p:spTree>
+    <p:extLst>
+      <p:ext uri="{BB962C8B-B14F-4D97-AF65-F5344CB8AC3E}">
+        <p14:creationId xmlns:p14="http://schemas.microsoft.com/office/powerpoint/2010/main" val="1681368073"/>
+      </p:ext>
+    </p:extLst>
+  </p:cSld>
+  <p:clrMapOvr>
+    <a:masterClrMapping/>
+  </p:clrMapOvr>
+</p:sld>
+</file>
+
+<file path=ppt/slides/slide11.xml><?xml version="1.0" encoding="utf-8"?>
+<p:sld xmlns:a="http://schemas.openxmlformats.org/drawingml/2006/main" xmlns:r="http://schemas.openxmlformats.org/officeDocument/2006/relationships" xmlns:p="http://schemas.openxmlformats.org/presentationml/2006/main">
+  <p:cSld>
+    <p:spTree>
+      <p:nvGrpSpPr>
+        <p:cNvPr id="1" name=""/>
+        <p:cNvGrpSpPr/>
+        <p:nvPr/>
+      </p:nvGrpSpPr>
+      <p:grpSpPr>
+        <a:xfrm>
+          <a:off x="0" y="0"/>
+          <a:ext cx="0" cy="0"/>
+          <a:chOff x="0" y="0"/>
+          <a:chExt cx="0" cy="0"/>
+        </a:xfrm>
+      </p:grpSpPr>
+      <p:sp>
+        <p:nvSpPr>
+          <p:cNvPr id="2" name="Title 1"/>
+          <p:cNvSpPr>
+            <a:spLocks noGrp="1"/>
+          </p:cNvSpPr>
+          <p:nvPr>
+            <p:ph type="title"/>
+          </p:nvPr>
+        </p:nvSpPr>
+        <p:spPr/>
+        <p:txBody>
+          <a:bodyPr/>
+          <a:lstStyle/>
+          <a:p>
+            <a:r>
+              <a:rPr lang="en-US" dirty="0" smtClean="0"/>
+              <a:t>Results</a:t>
+            </a:r>
+            <a:endParaRPr lang="en-US" dirty="0"/>
+          </a:p>
+        </p:txBody>
+      </p:sp>
+      <p:sp>
+        <p:nvSpPr>
+          <p:cNvPr id="3" name="Content Placeholder 2"/>
+          <p:cNvSpPr>
+            <a:spLocks noGrp="1"/>
+          </p:cNvSpPr>
+          <p:nvPr>
+            <p:ph idx="1"/>
+          </p:nvPr>
+        </p:nvSpPr>
+        <p:spPr/>
+        <p:txBody>
+          <a:bodyPr/>
+          <a:lstStyle/>
+          <a:p>
             <a:endParaRPr lang="en-US" dirty="0"/>
           </a:p>
         </p:txBody>
@@ -13777,7 +14634,159 @@
     </p:spTree>
     <p:extLst>
       <p:ext uri="{BB962C8B-B14F-4D97-AF65-F5344CB8AC3E}">
-        <p14:creationId xmlns:p14="http://schemas.microsoft.com/office/powerpoint/2010/main" val="1927784821"/>
+        <p14:creationId xmlns:p14="http://schemas.microsoft.com/office/powerpoint/2010/main" val="1824086218"/>
+      </p:ext>
+    </p:extLst>
+  </p:cSld>
+  <p:clrMapOvr>
+    <a:masterClrMapping/>
+  </p:clrMapOvr>
+</p:sld>
+</file>
+
+<file path=ppt/slides/slide12.xml><?xml version="1.0" encoding="utf-8"?>
+<p:sld xmlns:a="http://schemas.openxmlformats.org/drawingml/2006/main" xmlns:r="http://schemas.openxmlformats.org/officeDocument/2006/relationships" xmlns:p="http://schemas.openxmlformats.org/presentationml/2006/main">
+  <p:cSld>
+    <p:spTree>
+      <p:nvGrpSpPr>
+        <p:cNvPr id="1" name=""/>
+        <p:cNvGrpSpPr/>
+        <p:nvPr/>
+      </p:nvGrpSpPr>
+      <p:grpSpPr>
+        <a:xfrm>
+          <a:off x="0" y="0"/>
+          <a:ext cx="0" cy="0"/>
+          <a:chOff x="0" y="0"/>
+          <a:chExt cx="0" cy="0"/>
+        </a:xfrm>
+      </p:grpSpPr>
+      <p:sp>
+        <p:nvSpPr>
+          <p:cNvPr id="2" name="Title 1"/>
+          <p:cNvSpPr>
+            <a:spLocks noGrp="1"/>
+          </p:cNvSpPr>
+          <p:nvPr>
+            <p:ph type="title"/>
+          </p:nvPr>
+        </p:nvSpPr>
+        <p:spPr/>
+        <p:txBody>
+          <a:bodyPr/>
+          <a:lstStyle/>
+          <a:p>
+            <a:r>
+              <a:rPr lang="en-US" dirty="0" smtClean="0"/>
+              <a:t>Evaluation </a:t>
+            </a:r>
+            <a:r>
+              <a:rPr lang="mr-IN" dirty="0" smtClean="0"/>
+              <a:t>–</a:t>
+            </a:r>
+            <a:r>
+              <a:rPr lang="en-US" dirty="0" smtClean="0"/>
+              <a:t> Confusion Matrix</a:t>
+            </a:r>
+            <a:endParaRPr lang="en-US" dirty="0"/>
+          </a:p>
+        </p:txBody>
+      </p:sp>
+      <p:sp>
+        <p:nvSpPr>
+          <p:cNvPr id="3" name="Content Placeholder 2"/>
+          <p:cNvSpPr>
+            <a:spLocks noGrp="1"/>
+          </p:cNvSpPr>
+          <p:nvPr>
+            <p:ph idx="1"/>
+          </p:nvPr>
+        </p:nvSpPr>
+        <p:spPr/>
+        <p:txBody>
+          <a:bodyPr/>
+          <a:lstStyle/>
+          <a:p>
+            <a:endParaRPr lang="en-US" dirty="0" smtClean="0"/>
+          </a:p>
+        </p:txBody>
+      </p:sp>
+    </p:spTree>
+    <p:extLst>
+      <p:ext uri="{BB962C8B-B14F-4D97-AF65-F5344CB8AC3E}">
+        <p14:creationId xmlns:p14="http://schemas.microsoft.com/office/powerpoint/2010/main" val="355585455"/>
+      </p:ext>
+    </p:extLst>
+  </p:cSld>
+  <p:clrMapOvr>
+    <a:masterClrMapping/>
+  </p:clrMapOvr>
+</p:sld>
+</file>
+
+<file path=ppt/slides/slide13.xml><?xml version="1.0" encoding="utf-8"?>
+<p:sld xmlns:a="http://schemas.openxmlformats.org/drawingml/2006/main" xmlns:r="http://schemas.openxmlformats.org/officeDocument/2006/relationships" xmlns:p="http://schemas.openxmlformats.org/presentationml/2006/main">
+  <p:cSld>
+    <p:spTree>
+      <p:nvGrpSpPr>
+        <p:cNvPr id="1" name=""/>
+        <p:cNvGrpSpPr/>
+        <p:nvPr/>
+      </p:nvGrpSpPr>
+      <p:grpSpPr>
+        <a:xfrm>
+          <a:off x="0" y="0"/>
+          <a:ext cx="0" cy="0"/>
+          <a:chOff x="0" y="0"/>
+          <a:chExt cx="0" cy="0"/>
+        </a:xfrm>
+      </p:grpSpPr>
+      <p:sp>
+        <p:nvSpPr>
+          <p:cNvPr id="2" name="Title 1"/>
+          <p:cNvSpPr>
+            <a:spLocks noGrp="1"/>
+          </p:cNvSpPr>
+          <p:nvPr>
+            <p:ph type="title"/>
+          </p:nvPr>
+        </p:nvSpPr>
+        <p:spPr/>
+        <p:txBody>
+          <a:bodyPr/>
+          <a:lstStyle/>
+          <a:p>
+            <a:r>
+              <a:rPr lang="en-US" dirty="0" smtClean="0"/>
+              <a:t>Division of Work</a:t>
+            </a:r>
+            <a:endParaRPr lang="en-US" dirty="0"/>
+          </a:p>
+        </p:txBody>
+      </p:sp>
+      <p:sp>
+        <p:nvSpPr>
+          <p:cNvPr id="3" name="Content Placeholder 2"/>
+          <p:cNvSpPr>
+            <a:spLocks noGrp="1"/>
+          </p:cNvSpPr>
+          <p:nvPr>
+            <p:ph idx="1"/>
+          </p:nvPr>
+        </p:nvSpPr>
+        <p:spPr/>
+        <p:txBody>
+          <a:bodyPr/>
+          <a:lstStyle/>
+          <a:p>
+            <a:endParaRPr lang="en-US"/>
+          </a:p>
+        </p:txBody>
+      </p:sp>
+    </p:spTree>
+    <p:extLst>
+      <p:ext uri="{BB962C8B-B14F-4D97-AF65-F5344CB8AC3E}">
+        <p14:creationId xmlns:p14="http://schemas.microsoft.com/office/powerpoint/2010/main" val="1988511273"/>
       </p:ext>
     </p:extLst>
   </p:cSld>
@@ -13817,7 +14826,7 @@
           <p:cNvPr id="19" name="Rectangle 18">
             <a:extLst>
               <a:ext uri="{FF2B5EF4-FFF2-40B4-BE49-F238E27FC236}">
-                <a16:creationId xmlns:a16="http://schemas.microsoft.com/office/drawing/2014/main" xmlns="" id="{9F5E263C-FB7E-4A3E-AD04-5140CD3D1D97}"/>
+                <a16:creationId xmlns="" xmlns:a16="http://schemas.microsoft.com/office/drawing/2014/main" id="{9F5E263C-FB7E-4A3E-AD04-5140CD3D1D97}"/>
               </a:ext>
             </a:extLst>
           </p:cNvPr>
@@ -13874,7 +14883,7 @@
           <p:cNvPr id="21" name="Rectangle 20">
             <a:extLst>
               <a:ext uri="{FF2B5EF4-FFF2-40B4-BE49-F238E27FC236}">
-                <a16:creationId xmlns:a16="http://schemas.microsoft.com/office/drawing/2014/main" xmlns="" id="{9E65ED8C-90F7-4EB0-ACCB-64AEF411E8B9}"/>
+                <a16:creationId xmlns="" xmlns:a16="http://schemas.microsoft.com/office/drawing/2014/main" id="{9E65ED8C-90F7-4EB0-ACCB-64AEF411E8B9}"/>
               </a:ext>
             </a:extLst>
           </p:cNvPr>
@@ -13926,7 +14935,7 @@
           <p:cNvPr id="23" name="Rectangle 22">
             <a:extLst>
               <a:ext uri="{FF2B5EF4-FFF2-40B4-BE49-F238E27FC236}">
-                <a16:creationId xmlns:a16="http://schemas.microsoft.com/office/drawing/2014/main" xmlns="" id="{6604E3BF-88F7-4D19-BEC9-8486966EA467}"/>
+                <a16:creationId xmlns="" xmlns:a16="http://schemas.microsoft.com/office/drawing/2014/main" id="{6604E3BF-88F7-4D19-BEC9-8486966EA467}"/>
               </a:ext>
             </a:extLst>
           </p:cNvPr>
@@ -14074,7 +15083,7 @@
           <p:cNvPr id="10" name="Rectangle 9">
             <a:extLst>
               <a:ext uri="{FF2B5EF4-FFF2-40B4-BE49-F238E27FC236}">
-                <a16:creationId xmlns:a16="http://schemas.microsoft.com/office/drawing/2014/main" xmlns="" id="{38247643-37AB-47DE-B7BD-7A64FEB13371}"/>
+                <a16:creationId xmlns="" xmlns:a16="http://schemas.microsoft.com/office/drawing/2014/main" id="{38247643-37AB-47DE-B7BD-7A64FEB13371}"/>
               </a:ext>
             </a:extLst>
           </p:cNvPr>
@@ -14126,7 +15135,7 @@
           <p:cNvPr id="12" name="Rectangle 11">
             <a:extLst>
               <a:ext uri="{FF2B5EF4-FFF2-40B4-BE49-F238E27FC236}">
-                <a16:creationId xmlns:a16="http://schemas.microsoft.com/office/drawing/2014/main" xmlns="" id="{AEBC3119-F8E7-4266-91B8-7A1E808B481B}"/>
+                <a16:creationId xmlns="" xmlns:a16="http://schemas.microsoft.com/office/drawing/2014/main" id="{AEBC3119-F8E7-4266-91B8-7A1E808B481B}"/>
               </a:ext>
             </a:extLst>
           </p:cNvPr>
@@ -14178,7 +15187,7 @@
           <p:cNvPr id="14" name="Straight Connector 13">
             <a:extLst>
               <a:ext uri="{FF2B5EF4-FFF2-40B4-BE49-F238E27FC236}">
-                <a16:creationId xmlns:a16="http://schemas.microsoft.com/office/drawing/2014/main" xmlns="" id="{57D15890-6502-4FAA-AB03-AFAC88EE29D1}"/>
+                <a16:creationId xmlns="" xmlns:a16="http://schemas.microsoft.com/office/drawing/2014/main" id="{57D15890-6502-4FAA-AB03-AFAC88EE29D1}"/>
               </a:ext>
             </a:extLst>
           </p:cNvPr>
@@ -14230,7 +15239,7 @@
           <p:cNvPr id="16" name="Rectangle 15">
             <a:extLst>
               <a:ext uri="{FF2B5EF4-FFF2-40B4-BE49-F238E27FC236}">
-                <a16:creationId xmlns:a16="http://schemas.microsoft.com/office/drawing/2014/main" xmlns="" id="{B80045BC-58DB-469C-8997-6C0C16B1739C}"/>
+                <a16:creationId xmlns="" xmlns:a16="http://schemas.microsoft.com/office/drawing/2014/main" id="{B80045BC-58DB-469C-8997-6C0C16B1739C}"/>
               </a:ext>
             </a:extLst>
           </p:cNvPr>
@@ -14287,7 +15296,7 @@
           <p:cNvPr id="18" name="Rectangle 17">
             <a:extLst>
               <a:ext uri="{FF2B5EF4-FFF2-40B4-BE49-F238E27FC236}">
-                <a16:creationId xmlns:a16="http://schemas.microsoft.com/office/drawing/2014/main" xmlns="" id="{00C07DB3-666C-4A9D-81CE-83B435F95BB5}"/>
+                <a16:creationId xmlns="" xmlns:a16="http://schemas.microsoft.com/office/drawing/2014/main" id="{00C07DB3-666C-4A9D-81CE-83B435F95BB5}"/>
               </a:ext>
             </a:extLst>
           </p:cNvPr>
@@ -14339,7 +15348,7 @@
           <p:cNvPr id="20" name="Rectangle 19">
             <a:extLst>
               <a:ext uri="{FF2B5EF4-FFF2-40B4-BE49-F238E27FC236}">
-                <a16:creationId xmlns:a16="http://schemas.microsoft.com/office/drawing/2014/main" xmlns="" id="{150BDA68-EBDD-443C-9B6B-03CA14AFFB3A}"/>
+                <a16:creationId xmlns="" xmlns:a16="http://schemas.microsoft.com/office/drawing/2014/main" id="{150BDA68-EBDD-443C-9B6B-03CA14AFFB3A}"/>
               </a:ext>
             </a:extLst>
           </p:cNvPr>
@@ -14391,7 +15400,7 @@
           <p:cNvPr id="22" name="Straight Connector 21">
             <a:extLst>
               <a:ext uri="{FF2B5EF4-FFF2-40B4-BE49-F238E27FC236}">
-                <a16:creationId xmlns:a16="http://schemas.microsoft.com/office/drawing/2014/main" xmlns="" id="{83EF6BB5-A95D-4C59-808C-3B64F444F29D}"/>
+                <a16:creationId xmlns="" xmlns:a16="http://schemas.microsoft.com/office/drawing/2014/main" id="{83EF6BB5-A95D-4C59-808C-3B64F444F29D}"/>
               </a:ext>
             </a:extLst>
           </p:cNvPr>
@@ -14574,7 +15583,7 @@
           <p:cNvPr id="10" name="Rectangle 9">
             <a:extLst>
               <a:ext uri="{FF2B5EF4-FFF2-40B4-BE49-F238E27FC236}">
-                <a16:creationId xmlns:a16="http://schemas.microsoft.com/office/drawing/2014/main" xmlns="" id="{9F5E263C-FB7E-4A3E-AD04-5140CD3D1D97}"/>
+                <a16:creationId xmlns="" xmlns:a16="http://schemas.microsoft.com/office/drawing/2014/main" id="{9F5E263C-FB7E-4A3E-AD04-5140CD3D1D97}"/>
               </a:ext>
             </a:extLst>
           </p:cNvPr>
@@ -14631,7 +15640,7 @@
           <p:cNvPr id="12" name="Rectangle 11">
             <a:extLst>
               <a:ext uri="{FF2B5EF4-FFF2-40B4-BE49-F238E27FC236}">
-                <a16:creationId xmlns:a16="http://schemas.microsoft.com/office/drawing/2014/main" xmlns="" id="{9E65ED8C-90F7-4EB0-ACCB-64AEF411E8B9}"/>
+                <a16:creationId xmlns="" xmlns:a16="http://schemas.microsoft.com/office/drawing/2014/main" id="{9E65ED8C-90F7-4EB0-ACCB-64AEF411E8B9}"/>
               </a:ext>
             </a:extLst>
           </p:cNvPr>
@@ -14683,7 +15692,7 @@
           <p:cNvPr id="14" name="Rectangle 13">
             <a:extLst>
               <a:ext uri="{FF2B5EF4-FFF2-40B4-BE49-F238E27FC236}">
-                <a16:creationId xmlns:a16="http://schemas.microsoft.com/office/drawing/2014/main" xmlns="" id="{6604E3BF-88F7-4D19-BEC9-8486966EA467}"/>
+                <a16:creationId xmlns="" xmlns:a16="http://schemas.microsoft.com/office/drawing/2014/main" id="{6604E3BF-88F7-4D19-BEC9-8486966EA467}"/>
               </a:ext>
             </a:extLst>
           </p:cNvPr>
@@ -15007,7 +16016,7 @@
           <a:p>
             <a:r>
               <a:rPr lang="en-US" dirty="0" smtClean="0"/>
-              <a:t>Results</a:t>
+              <a:t>Feature extraction</a:t>
             </a:r>
             <a:endParaRPr lang="en-US" dirty="0"/>
           </a:p>
@@ -15015,27 +16024,157 @@
       </p:sp>
       <p:sp>
         <p:nvSpPr>
-          <p:cNvPr id="3" name="Content Placeholder 2"/>
-          <p:cNvSpPr>
-            <a:spLocks noGrp="1"/>
-          </p:cNvSpPr>
-          <p:nvPr>
-            <p:ph idx="1"/>
-          </p:nvPr>
+          <p:cNvPr id="6" name="Rectangle 5"/>
+          <p:cNvSpPr/>
+          <p:nvPr/>
         </p:nvSpPr>
-        <p:spPr/>
+        <p:spPr>
+          <a:xfrm>
+            <a:off x="1097280" y="2412812"/>
+            <a:ext cx="10058400" cy="646331"/>
+          </a:xfrm>
+          <a:prstGeom prst="rect">
+            <a:avLst/>
+          </a:prstGeom>
+        </p:spPr>
         <p:txBody>
-          <a:bodyPr/>
+          <a:bodyPr wrap="square">
+            <a:spAutoFit/>
+          </a:bodyPr>
           <a:lstStyle/>
           <a:p>
+            <a:r>
+              <a:rPr lang="en-US" dirty="0" smtClean="0"/>
+              <a:t>There </a:t>
+            </a:r>
+            <a:r>
+              <a:rPr lang="en-US" dirty="0"/>
+              <a:t>are two fundamental truths in this world: Paul Ryan desperately wants to be president. And Paul Ryan will never be president. Today proved it.</a:t>
+            </a:r>
+          </a:p>
+        </p:txBody>
+      </p:sp>
+      <p:sp>
+        <p:nvSpPr>
+          <p:cNvPr id="8" name="TextBox 7"/>
+          <p:cNvSpPr txBox="1"/>
+          <p:nvPr/>
+        </p:nvSpPr>
+        <p:spPr>
+          <a:xfrm>
+            <a:off x="1097280" y="1890420"/>
+            <a:ext cx="2119745" cy="369332"/>
+          </a:xfrm>
+          <a:prstGeom prst="rect">
+            <a:avLst/>
+          </a:prstGeom>
+          <a:noFill/>
+        </p:spPr>
+        <p:txBody>
+          <a:bodyPr wrap="square" rtlCol="0">
+            <a:spAutoFit/>
+          </a:bodyPr>
+          <a:lstStyle/>
+          <a:p>
+            <a:r>
+              <a:rPr lang="en-US" smtClean="0"/>
+              <a:t>Document 1:</a:t>
+            </a:r>
+          </a:p>
+        </p:txBody>
+      </p:sp>
+      <p:sp>
+        <p:nvSpPr>
+          <p:cNvPr id="10" name="TextBox 9"/>
+          <p:cNvSpPr txBox="1"/>
+          <p:nvPr/>
+        </p:nvSpPr>
+        <p:spPr>
+          <a:xfrm>
+            <a:off x="1097278" y="4041957"/>
+            <a:ext cx="9681557" cy="1200329"/>
+          </a:xfrm>
+          <a:prstGeom prst="rect">
+            <a:avLst/>
+          </a:prstGeom>
+          <a:noFill/>
+        </p:spPr>
+        <p:txBody>
+          <a:bodyPr wrap="square" rtlCol="0">
+            <a:spAutoFit/>
+          </a:bodyPr>
+          <a:lstStyle/>
+          <a:p>
+            <a:pPr marL="285750" indent="-285750">
+              <a:buFont typeface="Arial" charset="0"/>
+              <a:buChar char="•"/>
+            </a:pPr>
+            <a:r>
+              <a:rPr lang="en-US" dirty="0" smtClean="0"/>
+              <a:t>Occurrence of words</a:t>
+            </a:r>
+          </a:p>
+          <a:p>
+            <a:pPr marL="285750" indent="-285750">
+              <a:buFont typeface="Arial" charset="0"/>
+              <a:buChar char="•"/>
+            </a:pPr>
+            <a:r>
+              <a:rPr lang="en-US" dirty="0" smtClean="0"/>
+              <a:t>Certain patterns</a:t>
+            </a:r>
+          </a:p>
+          <a:p>
+            <a:pPr marL="285750" indent="-285750">
+              <a:buFont typeface="Arial" charset="0"/>
+              <a:buChar char="•"/>
+            </a:pPr>
+            <a:r>
+              <a:rPr lang="en-US" dirty="0" smtClean="0"/>
+              <a:t>Specific symbols</a:t>
+            </a:r>
+          </a:p>
+          <a:p>
             <a:endParaRPr lang="en-US" dirty="0"/>
+          </a:p>
+        </p:txBody>
+      </p:sp>
+      <p:sp>
+        <p:nvSpPr>
+          <p:cNvPr id="11" name="TextBox 10"/>
+          <p:cNvSpPr txBox="1"/>
+          <p:nvPr/>
+        </p:nvSpPr>
+        <p:spPr>
+          <a:xfrm>
+            <a:off x="1097279" y="3519565"/>
+            <a:ext cx="10058402" cy="369332"/>
+          </a:xfrm>
+          <a:prstGeom prst="rect">
+            <a:avLst/>
+          </a:prstGeom>
+          <a:noFill/>
+          <a:ln>
+            <a:noFill/>
+          </a:ln>
+        </p:spPr>
+        <p:txBody>
+          <a:bodyPr wrap="square" rtlCol="0">
+            <a:spAutoFit/>
+          </a:bodyPr>
+          <a:lstStyle/>
+          <a:p>
+            <a:r>
+              <a:rPr lang="en-US" dirty="0" smtClean="0"/>
+              <a:t>Feature could be:</a:t>
+            </a:r>
           </a:p>
         </p:txBody>
       </p:sp>
     </p:spTree>
     <p:extLst>
       <p:ext uri="{BB962C8B-B14F-4D97-AF65-F5344CB8AC3E}">
-        <p14:creationId xmlns:p14="http://schemas.microsoft.com/office/powerpoint/2010/main" val="1824086218"/>
+        <p14:creationId xmlns:p14="http://schemas.microsoft.com/office/powerpoint/2010/main" val="1995843097"/>
       </p:ext>
     </p:extLst>
   </p:cSld>
@@ -15079,15 +16218,7 @@
           <a:p>
             <a:r>
               <a:rPr lang="en-US" dirty="0" smtClean="0"/>
-              <a:t>Evaluation </a:t>
-            </a:r>
-            <a:r>
-              <a:rPr lang="mr-IN" dirty="0" smtClean="0"/>
-              <a:t>–</a:t>
-            </a:r>
-            <a:r>
-              <a:rPr lang="en-US" dirty="0" smtClean="0"/>
-              <a:t> Confusion Matrix</a:t>
+              <a:t>Preprocessing</a:t>
             </a:r>
             <a:endParaRPr lang="en-US" dirty="0"/>
           </a:p>
@@ -15095,27 +16226,213 @@
       </p:sp>
       <p:sp>
         <p:nvSpPr>
-          <p:cNvPr id="3" name="Content Placeholder 2"/>
-          <p:cNvSpPr>
-            <a:spLocks noGrp="1"/>
-          </p:cNvSpPr>
-          <p:nvPr>
-            <p:ph idx="1"/>
-          </p:nvPr>
+          <p:cNvPr id="10" name="Rectangle 9"/>
+          <p:cNvSpPr/>
+          <p:nvPr/>
         </p:nvSpPr>
-        <p:spPr/>
+        <p:spPr>
+          <a:xfrm>
+            <a:off x="3325784" y="1977388"/>
+            <a:ext cx="5601392" cy="923330"/>
+          </a:xfrm>
+          <a:prstGeom prst="rect">
+            <a:avLst/>
+          </a:prstGeom>
+        </p:spPr>
+        <p:style>
+          <a:lnRef idx="2">
+            <a:schemeClr val="accent1"/>
+          </a:lnRef>
+          <a:fillRef idx="1">
+            <a:schemeClr val="lt1"/>
+          </a:fillRef>
+          <a:effectRef idx="0">
+            <a:schemeClr val="accent1"/>
+          </a:effectRef>
+          <a:fontRef idx="minor">
+            <a:schemeClr val="dk1"/>
+          </a:fontRef>
+        </p:style>
         <p:txBody>
-          <a:bodyPr/>
+          <a:bodyPr wrap="square">
+            <a:spAutoFit/>
+          </a:bodyPr>
           <a:lstStyle/>
           <a:p>
+            <a:r>
+              <a:rPr lang="en-US" dirty="0" smtClean="0"/>
+              <a:t>There </a:t>
+            </a:r>
+            <a:r>
+              <a:rPr lang="en-US" dirty="0"/>
+              <a:t>are two fundamental truths in this world: Paul Ryan desperately wants to be president. And Paul Ryan will never be president. Today proved it.</a:t>
+            </a:r>
+          </a:p>
+        </p:txBody>
+      </p:sp>
+      <p:sp>
+        <p:nvSpPr>
+          <p:cNvPr id="4" name="TextBox 3"/>
+          <p:cNvSpPr txBox="1"/>
+          <p:nvPr/>
+        </p:nvSpPr>
+        <p:spPr>
+          <a:xfrm>
+            <a:off x="1097280" y="3140746"/>
+            <a:ext cx="2943092" cy="2308324"/>
+          </a:xfrm>
+          <a:prstGeom prst="rect">
+            <a:avLst/>
+          </a:prstGeom>
+        </p:spPr>
+        <p:style>
+          <a:lnRef idx="2">
+            <a:schemeClr val="accent1"/>
+          </a:lnRef>
+          <a:fillRef idx="1">
+            <a:schemeClr val="lt1"/>
+          </a:fillRef>
+          <a:effectRef idx="0">
+            <a:schemeClr val="accent1"/>
+          </a:effectRef>
+          <a:fontRef idx="minor">
+            <a:schemeClr val="dk1"/>
+          </a:fontRef>
+        </p:style>
+        <p:txBody>
+          <a:bodyPr wrap="square" rtlCol="0">
+            <a:spAutoFit/>
+          </a:bodyPr>
+          <a:lstStyle/>
+          <a:p>
+            <a:r>
+              <a:rPr lang="en-US" dirty="0" smtClean="0"/>
+              <a:t>Stop words extraction:</a:t>
+            </a:r>
+          </a:p>
+          <a:p>
+            <a:r>
+              <a:rPr lang="en-US" dirty="0"/>
+              <a:t>the words that are frequent in our natural language but usually doesn’t have additional information, such as words like a, on, this, the, is, etc.</a:t>
+            </a:r>
+          </a:p>
+          <a:p>
+            <a:endParaRPr lang="en-US" dirty="0"/>
+          </a:p>
+        </p:txBody>
+      </p:sp>
+      <p:sp>
+        <p:nvSpPr>
+          <p:cNvPr id="11" name="TextBox 10"/>
+          <p:cNvSpPr txBox="1"/>
+          <p:nvPr/>
+        </p:nvSpPr>
+        <p:spPr>
+          <a:xfrm>
+            <a:off x="4762886" y="3140746"/>
+            <a:ext cx="2727187" cy="2585323"/>
+          </a:xfrm>
+          <a:prstGeom prst="rect">
+            <a:avLst/>
+          </a:prstGeom>
+        </p:spPr>
+        <p:style>
+          <a:lnRef idx="2">
+            <a:schemeClr val="accent1"/>
+          </a:lnRef>
+          <a:fillRef idx="1">
+            <a:schemeClr val="lt1"/>
+          </a:fillRef>
+          <a:effectRef idx="0">
+            <a:schemeClr val="accent1"/>
+          </a:effectRef>
+          <a:fontRef idx="minor">
+            <a:schemeClr val="dk1"/>
+          </a:fontRef>
+        </p:style>
+        <p:txBody>
+          <a:bodyPr wrap="square" rtlCol="0">
+            <a:spAutoFit/>
+          </a:bodyPr>
+          <a:lstStyle/>
+          <a:p>
+            <a:r>
+              <a:rPr lang="en-US" dirty="0" smtClean="0"/>
+              <a:t>Tokenization:</a:t>
+            </a:r>
+          </a:p>
+          <a:p>
+            <a:r>
+              <a:rPr lang="en-US" dirty="0"/>
+              <a:t>document will be tokenized into a list of words, with all the punctuation being taken away, all words are lower cased.</a:t>
+            </a:r>
+          </a:p>
+          <a:p>
             <a:endParaRPr lang="en-US" dirty="0" smtClean="0"/>
+          </a:p>
+          <a:p>
+            <a:endParaRPr lang="en-US" dirty="0"/>
+          </a:p>
+        </p:txBody>
+      </p:sp>
+      <p:sp>
+        <p:nvSpPr>
+          <p:cNvPr id="12" name="TextBox 11"/>
+          <p:cNvSpPr txBox="1"/>
+          <p:nvPr/>
+        </p:nvSpPr>
+        <p:spPr>
+          <a:xfrm>
+            <a:off x="8131924" y="3186912"/>
+            <a:ext cx="3023755" cy="2585323"/>
+          </a:xfrm>
+          <a:prstGeom prst="rect">
+            <a:avLst/>
+          </a:prstGeom>
+        </p:spPr>
+        <p:style>
+          <a:lnRef idx="2">
+            <a:schemeClr val="accent1"/>
+          </a:lnRef>
+          <a:fillRef idx="1">
+            <a:schemeClr val="lt1"/>
+          </a:fillRef>
+          <a:effectRef idx="0">
+            <a:schemeClr val="accent1"/>
+          </a:effectRef>
+          <a:fontRef idx="minor">
+            <a:schemeClr val="dk1"/>
+          </a:fontRef>
+        </p:style>
+        <p:txBody>
+          <a:bodyPr wrap="square" rtlCol="0">
+            <a:spAutoFit/>
+          </a:bodyPr>
+          <a:lstStyle/>
+          <a:p>
+            <a:r>
+              <a:rPr lang="en-US" dirty="0" smtClean="0"/>
+              <a:t>Stemming:</a:t>
+            </a:r>
+          </a:p>
+          <a:p>
+            <a:endParaRPr lang="en-US" dirty="0" smtClean="0"/>
+          </a:p>
+          <a:p>
+            <a:r>
+              <a:rPr lang="en-US" dirty="0"/>
+              <a:t>words that has the same roots are assigned to a same root word. For example: attack, attacking and attacked will be categorized as the same root word: attack. </a:t>
+            </a:r>
+          </a:p>
+          <a:p>
+            <a:endParaRPr lang="en-US" dirty="0"/>
           </a:p>
         </p:txBody>
       </p:sp>
     </p:spTree>
     <p:extLst>
       <p:ext uri="{BB962C8B-B14F-4D97-AF65-F5344CB8AC3E}">
-        <p14:creationId xmlns:p14="http://schemas.microsoft.com/office/powerpoint/2010/main" val="355585455"/>
+        <p14:creationId xmlns:p14="http://schemas.microsoft.com/office/powerpoint/2010/main" val="1923258264"/>
       </p:ext>
     </p:extLst>
   </p:cSld>
@@ -15159,35 +16476,612 @@
           <a:p>
             <a:r>
               <a:rPr lang="en-US" dirty="0" smtClean="0"/>
-              <a:t>Division of Work</a:t>
+              <a:t>Working on the matrix!</a:t>
             </a:r>
             <a:endParaRPr lang="en-US" dirty="0"/>
           </a:p>
         </p:txBody>
       </p:sp>
+      <p:graphicFrame>
+        <p:nvGraphicFramePr>
+          <p:cNvPr id="8" name="Table 7"/>
+          <p:cNvGraphicFramePr>
+            <a:graphicFrameLocks noGrp="1"/>
+          </p:cNvGraphicFramePr>
+          <p:nvPr>
+            <p:extLst>
+              <p:ext uri="{D42A27DB-BD31-4B8C-83A1-F6EECF244321}">
+                <p14:modId xmlns:p14="http://schemas.microsoft.com/office/powerpoint/2010/main" val="2099379237"/>
+              </p:ext>
+            </p:extLst>
+          </p:nvPr>
+        </p:nvGraphicFramePr>
+        <p:xfrm>
+          <a:off x="5486398" y="2171700"/>
+          <a:ext cx="4926695" cy="2465616"/>
+        </p:xfrm>
+        <a:graphic>
+          <a:graphicData uri="http://schemas.openxmlformats.org/drawingml/2006/table">
+            <a:tbl>
+              <a:tblPr>
+                <a:tableStyleId>{5C22544A-7EE6-4342-B048-85BDC9FD1C3A}</a:tableStyleId>
+              </a:tblPr>
+              <a:tblGrid>
+                <a:gridCol w="985339"/>
+                <a:gridCol w="985339"/>
+                <a:gridCol w="985339"/>
+                <a:gridCol w="985339"/>
+                <a:gridCol w="985339"/>
+              </a:tblGrid>
+              <a:tr h="616404">
+                <a:tc>
+                  <a:txBody>
+                    <a:bodyPr/>
+                    <a:lstStyle/>
+                    <a:p>
+                      <a:pPr algn="ctr" fontAlgn="b"/>
+                      <a:r>
+                        <a:rPr lang="mr-IN" sz="1200" u="none" strike="noStrike">
+                          <a:effectLst/>
+                        </a:rPr>
+                        <a:t>f(w1, d1)</a:t>
+                      </a:r>
+                      <a:endParaRPr lang="mr-IN" sz="1200" b="0" i="0" u="none" strike="noStrike">
+                        <a:solidFill>
+                          <a:srgbClr val="000000"/>
+                        </a:solidFill>
+                        <a:effectLst/>
+                        <a:latin typeface="Calibri" charset="0"/>
+                      </a:endParaRPr>
+                    </a:p>
+                  </a:txBody>
+                  <a:tcPr marL="6350" marR="6350" marT="6350" marB="0" anchor="b"/>
+                </a:tc>
+                <a:tc>
+                  <a:txBody>
+                    <a:bodyPr/>
+                    <a:lstStyle/>
+                    <a:p>
+                      <a:pPr algn="ctr" fontAlgn="b"/>
+                      <a:r>
+                        <a:rPr lang="mr-IN" sz="1200" u="none" strike="noStrike">
+                          <a:effectLst/>
+                        </a:rPr>
+                        <a:t>f(w2, d1)</a:t>
+                      </a:r>
+                      <a:endParaRPr lang="mr-IN" sz="1200" b="0" i="0" u="none" strike="noStrike">
+                        <a:solidFill>
+                          <a:srgbClr val="000000"/>
+                        </a:solidFill>
+                        <a:effectLst/>
+                        <a:latin typeface="Calibri" charset="0"/>
+                      </a:endParaRPr>
+                    </a:p>
+                  </a:txBody>
+                  <a:tcPr marL="6350" marR="6350" marT="6350" marB="0" anchor="b"/>
+                </a:tc>
+                <a:tc>
+                  <a:txBody>
+                    <a:bodyPr/>
+                    <a:lstStyle/>
+                    <a:p>
+                      <a:pPr algn="ctr" fontAlgn="b"/>
+                      <a:r>
+                        <a:rPr lang="mr-IN" sz="1200" u="none" strike="noStrike">
+                          <a:effectLst/>
+                        </a:rPr>
+                        <a:t>f(w3, d1)</a:t>
+                      </a:r>
+                      <a:endParaRPr lang="mr-IN" sz="1200" b="0" i="0" u="none" strike="noStrike">
+                        <a:solidFill>
+                          <a:srgbClr val="000000"/>
+                        </a:solidFill>
+                        <a:effectLst/>
+                        <a:latin typeface="Calibri" charset="0"/>
+                      </a:endParaRPr>
+                    </a:p>
+                  </a:txBody>
+                  <a:tcPr marL="6350" marR="6350" marT="6350" marB="0" anchor="b"/>
+                </a:tc>
+                <a:tc>
+                  <a:txBody>
+                    <a:bodyPr/>
+                    <a:lstStyle/>
+                    <a:p>
+                      <a:pPr algn="ctr" fontAlgn="b"/>
+                      <a:r>
+                        <a:rPr lang="mr-IN" sz="1200" u="none" strike="noStrike">
+                          <a:effectLst/>
+                        </a:rPr>
+                        <a:t>…</a:t>
+                      </a:r>
+                      <a:endParaRPr lang="mr-IN" sz="1200" b="0" i="0" u="none" strike="noStrike">
+                        <a:solidFill>
+                          <a:srgbClr val="000000"/>
+                        </a:solidFill>
+                        <a:effectLst/>
+                        <a:latin typeface="Calibri" charset="0"/>
+                      </a:endParaRPr>
+                    </a:p>
+                  </a:txBody>
+                  <a:tcPr marL="6350" marR="6350" marT="6350" marB="0" anchor="b"/>
+                </a:tc>
+                <a:tc>
+                  <a:txBody>
+                    <a:bodyPr/>
+                    <a:lstStyle/>
+                    <a:p>
+                      <a:pPr algn="ctr" fontAlgn="b"/>
+                      <a:r>
+                        <a:rPr lang="en-US" sz="1200" u="none" strike="noStrike">
+                          <a:effectLst/>
+                        </a:rPr>
+                        <a:t>f(wn, d1)</a:t>
+                      </a:r>
+                      <a:endParaRPr lang="en-US" sz="1200" b="0" i="0" u="none" strike="noStrike">
+                        <a:solidFill>
+                          <a:srgbClr val="000000"/>
+                        </a:solidFill>
+                        <a:effectLst/>
+                        <a:latin typeface="Calibri" charset="0"/>
+                      </a:endParaRPr>
+                    </a:p>
+                  </a:txBody>
+                  <a:tcPr marL="6350" marR="6350" marT="6350" marB="0" anchor="b"/>
+                </a:tc>
+              </a:tr>
+              <a:tr h="616404">
+                <a:tc>
+                  <a:txBody>
+                    <a:bodyPr/>
+                    <a:lstStyle/>
+                    <a:p>
+                      <a:pPr algn="ctr" fontAlgn="b"/>
+                      <a:r>
+                        <a:rPr lang="mr-IN" sz="1200" u="none" strike="noStrike">
+                          <a:effectLst/>
+                        </a:rPr>
+                        <a:t>f(w1, d2)</a:t>
+                      </a:r>
+                      <a:endParaRPr lang="mr-IN" sz="1200" b="0" i="0" u="none" strike="noStrike">
+                        <a:solidFill>
+                          <a:srgbClr val="000000"/>
+                        </a:solidFill>
+                        <a:effectLst/>
+                        <a:latin typeface="Calibri" charset="0"/>
+                      </a:endParaRPr>
+                    </a:p>
+                  </a:txBody>
+                  <a:tcPr marL="6350" marR="6350" marT="6350" marB="0" anchor="b"/>
+                </a:tc>
+                <a:tc>
+                  <a:txBody>
+                    <a:bodyPr/>
+                    <a:lstStyle/>
+                    <a:p>
+                      <a:pPr algn="ctr" fontAlgn="b"/>
+                      <a:r>
+                        <a:rPr lang="mr-IN" sz="1200" u="none" strike="noStrike">
+                          <a:effectLst/>
+                        </a:rPr>
+                        <a:t>…</a:t>
+                      </a:r>
+                      <a:endParaRPr lang="mr-IN" sz="1200" b="0" i="0" u="none" strike="noStrike">
+                        <a:solidFill>
+                          <a:srgbClr val="000000"/>
+                        </a:solidFill>
+                        <a:effectLst/>
+                        <a:latin typeface="Calibri" charset="0"/>
+                      </a:endParaRPr>
+                    </a:p>
+                  </a:txBody>
+                  <a:tcPr marL="6350" marR="6350" marT="6350" marB="0" anchor="b"/>
+                </a:tc>
+                <a:tc>
+                  <a:txBody>
+                    <a:bodyPr/>
+                    <a:lstStyle/>
+                    <a:p>
+                      <a:pPr algn="ctr" fontAlgn="b"/>
+                      <a:r>
+                        <a:rPr lang="mr-IN" sz="1200" u="none" strike="noStrike" dirty="0">
+                          <a:effectLst/>
+                        </a:rPr>
+                        <a:t>…</a:t>
+                      </a:r>
+                      <a:endParaRPr lang="mr-IN" sz="1200" b="0" i="0" u="none" strike="noStrike" dirty="0">
+                        <a:solidFill>
+                          <a:srgbClr val="000000"/>
+                        </a:solidFill>
+                        <a:effectLst/>
+                        <a:latin typeface="Calibri" charset="0"/>
+                      </a:endParaRPr>
+                    </a:p>
+                  </a:txBody>
+                  <a:tcPr marL="6350" marR="6350" marT="6350" marB="0" anchor="b"/>
+                </a:tc>
+                <a:tc>
+                  <a:txBody>
+                    <a:bodyPr/>
+                    <a:lstStyle/>
+                    <a:p>
+                      <a:pPr algn="ctr" fontAlgn="b"/>
+                      <a:r>
+                        <a:rPr lang="mr-IN" sz="1200" u="none" strike="noStrike">
+                          <a:effectLst/>
+                        </a:rPr>
+                        <a:t>…</a:t>
+                      </a:r>
+                      <a:endParaRPr lang="mr-IN" sz="1200" b="0" i="0" u="none" strike="noStrike">
+                        <a:solidFill>
+                          <a:srgbClr val="000000"/>
+                        </a:solidFill>
+                        <a:effectLst/>
+                        <a:latin typeface="Calibri" charset="0"/>
+                      </a:endParaRPr>
+                    </a:p>
+                  </a:txBody>
+                  <a:tcPr marL="6350" marR="6350" marT="6350" marB="0" anchor="b"/>
+                </a:tc>
+                <a:tc>
+                  <a:txBody>
+                    <a:bodyPr/>
+                    <a:lstStyle/>
+                    <a:p>
+                      <a:pPr algn="ctr" fontAlgn="b"/>
+                      <a:r>
+                        <a:rPr lang="mr-IN" sz="1200" u="none" strike="noStrike">
+                          <a:effectLst/>
+                        </a:rPr>
+                        <a:t>…</a:t>
+                      </a:r>
+                      <a:endParaRPr lang="mr-IN" sz="1200" b="0" i="0" u="none" strike="noStrike">
+                        <a:solidFill>
+                          <a:srgbClr val="000000"/>
+                        </a:solidFill>
+                        <a:effectLst/>
+                        <a:latin typeface="Calibri" charset="0"/>
+                      </a:endParaRPr>
+                    </a:p>
+                  </a:txBody>
+                  <a:tcPr marL="6350" marR="6350" marT="6350" marB="0" anchor="b"/>
+                </a:tc>
+              </a:tr>
+              <a:tr h="616404">
+                <a:tc>
+                  <a:txBody>
+                    <a:bodyPr/>
+                    <a:lstStyle/>
+                    <a:p>
+                      <a:pPr algn="ctr" fontAlgn="b"/>
+                      <a:r>
+                        <a:rPr lang="mr-IN" sz="1200" u="none" strike="noStrike">
+                          <a:effectLst/>
+                        </a:rPr>
+                        <a:t>…</a:t>
+                      </a:r>
+                      <a:endParaRPr lang="mr-IN" sz="1200" b="0" i="0" u="none" strike="noStrike">
+                        <a:solidFill>
+                          <a:srgbClr val="000000"/>
+                        </a:solidFill>
+                        <a:effectLst/>
+                        <a:latin typeface="Calibri" charset="0"/>
+                      </a:endParaRPr>
+                    </a:p>
+                  </a:txBody>
+                  <a:tcPr marL="6350" marR="6350" marT="6350" marB="0" anchor="b"/>
+                </a:tc>
+                <a:tc>
+                  <a:txBody>
+                    <a:bodyPr/>
+                    <a:lstStyle/>
+                    <a:p>
+                      <a:pPr algn="ctr" fontAlgn="b"/>
+                      <a:r>
+                        <a:rPr lang="mr-IN" sz="1200" u="none" strike="noStrike">
+                          <a:effectLst/>
+                        </a:rPr>
+                        <a:t>…</a:t>
+                      </a:r>
+                      <a:endParaRPr lang="mr-IN" sz="1200" b="0" i="0" u="none" strike="noStrike">
+                        <a:solidFill>
+                          <a:srgbClr val="000000"/>
+                        </a:solidFill>
+                        <a:effectLst/>
+                        <a:latin typeface="Calibri" charset="0"/>
+                      </a:endParaRPr>
+                    </a:p>
+                  </a:txBody>
+                  <a:tcPr marL="6350" marR="6350" marT="6350" marB="0" anchor="b"/>
+                </a:tc>
+                <a:tc>
+                  <a:txBody>
+                    <a:bodyPr/>
+                    <a:lstStyle/>
+                    <a:p>
+                      <a:pPr algn="ctr" fontAlgn="b"/>
+                      <a:r>
+                        <a:rPr lang="mr-IN" sz="1200" u="none" strike="noStrike">
+                          <a:effectLst/>
+                        </a:rPr>
+                        <a:t>…</a:t>
+                      </a:r>
+                      <a:endParaRPr lang="mr-IN" sz="1200" b="0" i="0" u="none" strike="noStrike">
+                        <a:solidFill>
+                          <a:srgbClr val="000000"/>
+                        </a:solidFill>
+                        <a:effectLst/>
+                        <a:latin typeface="Calibri" charset="0"/>
+                      </a:endParaRPr>
+                    </a:p>
+                  </a:txBody>
+                  <a:tcPr marL="6350" marR="6350" marT="6350" marB="0" anchor="b"/>
+                </a:tc>
+                <a:tc>
+                  <a:txBody>
+                    <a:bodyPr/>
+                    <a:lstStyle/>
+                    <a:p>
+                      <a:pPr algn="ctr" fontAlgn="b"/>
+                      <a:r>
+                        <a:rPr lang="mr-IN" sz="1200" u="none" strike="noStrike">
+                          <a:effectLst/>
+                        </a:rPr>
+                        <a:t>…</a:t>
+                      </a:r>
+                      <a:endParaRPr lang="mr-IN" sz="1200" b="0" i="0" u="none" strike="noStrike">
+                        <a:solidFill>
+                          <a:srgbClr val="000000"/>
+                        </a:solidFill>
+                        <a:effectLst/>
+                        <a:latin typeface="Calibri" charset="0"/>
+                      </a:endParaRPr>
+                    </a:p>
+                  </a:txBody>
+                  <a:tcPr marL="6350" marR="6350" marT="6350" marB="0" anchor="b"/>
+                </a:tc>
+                <a:tc>
+                  <a:txBody>
+                    <a:bodyPr/>
+                    <a:lstStyle/>
+                    <a:p>
+                      <a:pPr algn="ctr" fontAlgn="b"/>
+                      <a:r>
+                        <a:rPr lang="mr-IN" sz="1200" u="none" strike="noStrike">
+                          <a:effectLst/>
+                        </a:rPr>
+                        <a:t>…</a:t>
+                      </a:r>
+                      <a:endParaRPr lang="mr-IN" sz="1200" b="0" i="0" u="none" strike="noStrike">
+                        <a:solidFill>
+                          <a:srgbClr val="000000"/>
+                        </a:solidFill>
+                        <a:effectLst/>
+                        <a:latin typeface="Calibri" charset="0"/>
+                      </a:endParaRPr>
+                    </a:p>
+                  </a:txBody>
+                  <a:tcPr marL="6350" marR="6350" marT="6350" marB="0" anchor="b"/>
+                </a:tc>
+              </a:tr>
+              <a:tr h="616404">
+                <a:tc>
+                  <a:txBody>
+                    <a:bodyPr/>
+                    <a:lstStyle/>
+                    <a:p>
+                      <a:pPr algn="ctr" fontAlgn="b"/>
+                      <a:r>
+                        <a:rPr lang="mr-IN" sz="1200" u="none" strike="noStrike">
+                          <a:effectLst/>
+                        </a:rPr>
+                        <a:t>f(w1, dm)</a:t>
+                      </a:r>
+                      <a:endParaRPr lang="mr-IN" sz="1200" b="0" i="0" u="none" strike="noStrike">
+                        <a:solidFill>
+                          <a:srgbClr val="000000"/>
+                        </a:solidFill>
+                        <a:effectLst/>
+                        <a:latin typeface="Calibri" charset="0"/>
+                      </a:endParaRPr>
+                    </a:p>
+                  </a:txBody>
+                  <a:tcPr marL="6350" marR="6350" marT="6350" marB="0" anchor="b"/>
+                </a:tc>
+                <a:tc>
+                  <a:txBody>
+                    <a:bodyPr/>
+                    <a:lstStyle/>
+                    <a:p>
+                      <a:pPr algn="ctr" fontAlgn="b"/>
+                      <a:r>
+                        <a:rPr lang="mr-IN" sz="1200" u="none" strike="noStrike">
+                          <a:effectLst/>
+                        </a:rPr>
+                        <a:t>…</a:t>
+                      </a:r>
+                      <a:endParaRPr lang="mr-IN" sz="1200" b="0" i="0" u="none" strike="noStrike">
+                        <a:solidFill>
+                          <a:srgbClr val="000000"/>
+                        </a:solidFill>
+                        <a:effectLst/>
+                        <a:latin typeface="Calibri" charset="0"/>
+                      </a:endParaRPr>
+                    </a:p>
+                  </a:txBody>
+                  <a:tcPr marL="6350" marR="6350" marT="6350" marB="0" anchor="b"/>
+                </a:tc>
+                <a:tc>
+                  <a:txBody>
+                    <a:bodyPr/>
+                    <a:lstStyle/>
+                    <a:p>
+                      <a:pPr algn="ctr" fontAlgn="b"/>
+                      <a:r>
+                        <a:rPr lang="mr-IN" sz="1200" u="none" strike="noStrike">
+                          <a:effectLst/>
+                        </a:rPr>
+                        <a:t>…</a:t>
+                      </a:r>
+                      <a:endParaRPr lang="mr-IN" sz="1200" b="0" i="0" u="none" strike="noStrike">
+                        <a:solidFill>
+                          <a:srgbClr val="000000"/>
+                        </a:solidFill>
+                        <a:effectLst/>
+                        <a:latin typeface="Calibri" charset="0"/>
+                      </a:endParaRPr>
+                    </a:p>
+                  </a:txBody>
+                  <a:tcPr marL="6350" marR="6350" marT="6350" marB="0" anchor="b"/>
+                </a:tc>
+                <a:tc>
+                  <a:txBody>
+                    <a:bodyPr/>
+                    <a:lstStyle/>
+                    <a:p>
+                      <a:pPr algn="ctr" fontAlgn="b"/>
+                      <a:r>
+                        <a:rPr lang="mr-IN" sz="1200" u="none" strike="noStrike">
+                          <a:effectLst/>
+                        </a:rPr>
+                        <a:t>…</a:t>
+                      </a:r>
+                      <a:endParaRPr lang="mr-IN" sz="1200" b="0" i="0" u="none" strike="noStrike">
+                        <a:solidFill>
+                          <a:srgbClr val="000000"/>
+                        </a:solidFill>
+                        <a:effectLst/>
+                        <a:latin typeface="Calibri" charset="0"/>
+                      </a:endParaRPr>
+                    </a:p>
+                  </a:txBody>
+                  <a:tcPr marL="6350" marR="6350" marT="6350" marB="0" anchor="b"/>
+                </a:tc>
+                <a:tc>
+                  <a:txBody>
+                    <a:bodyPr/>
+                    <a:lstStyle/>
+                    <a:p>
+                      <a:pPr algn="ctr" fontAlgn="b"/>
+                      <a:r>
+                        <a:rPr lang="mr-IN" sz="1200" u="none" strike="noStrike" dirty="0" err="1">
+                          <a:effectLst/>
+                        </a:rPr>
+                        <a:t>f</a:t>
+                      </a:r>
+                      <a:r>
+                        <a:rPr lang="mr-IN" sz="1200" u="none" strike="noStrike" dirty="0">
+                          <a:effectLst/>
+                        </a:rPr>
+                        <a:t>(</a:t>
+                      </a:r>
+                      <a:r>
+                        <a:rPr lang="mr-IN" sz="1200" u="none" strike="noStrike" dirty="0" err="1">
+                          <a:effectLst/>
+                        </a:rPr>
+                        <a:t>wn</a:t>
+                      </a:r>
+                      <a:r>
+                        <a:rPr lang="mr-IN" sz="1200" u="none" strike="noStrike" dirty="0">
+                          <a:effectLst/>
+                        </a:rPr>
+                        <a:t>, </a:t>
+                      </a:r>
+                      <a:r>
+                        <a:rPr lang="mr-IN" sz="1200" u="none" strike="noStrike" dirty="0" err="1">
+                          <a:effectLst/>
+                        </a:rPr>
+                        <a:t>dm</a:t>
+                      </a:r>
+                      <a:r>
+                        <a:rPr lang="mr-IN" sz="1200" u="none" strike="noStrike" dirty="0">
+                          <a:effectLst/>
+                        </a:rPr>
+                        <a:t>)</a:t>
+                      </a:r>
+                      <a:endParaRPr lang="mr-IN" sz="1200" b="0" i="0" u="none" strike="noStrike" dirty="0">
+                        <a:solidFill>
+                          <a:srgbClr val="000000"/>
+                        </a:solidFill>
+                        <a:effectLst/>
+                        <a:latin typeface="Calibri" charset="0"/>
+                      </a:endParaRPr>
+                    </a:p>
+                  </a:txBody>
+                  <a:tcPr marL="6350" marR="6350" marT="6350" marB="0" anchor="b"/>
+                </a:tc>
+              </a:tr>
+            </a:tbl>
+          </a:graphicData>
+        </a:graphic>
+      </p:graphicFrame>
       <p:sp>
         <p:nvSpPr>
-          <p:cNvPr id="3" name="Content Placeholder 2"/>
-          <p:cNvSpPr>
-            <a:spLocks noGrp="1"/>
-          </p:cNvSpPr>
-          <p:nvPr>
-            <p:ph idx="1"/>
-          </p:nvPr>
+          <p:cNvPr id="9" name="TextBox 8"/>
+          <p:cNvSpPr txBox="1"/>
+          <p:nvPr/>
         </p:nvSpPr>
-        <p:spPr/>
+        <p:spPr>
+          <a:xfrm>
+            <a:off x="1097280" y="2171700"/>
+            <a:ext cx="2952206" cy="2031325"/>
+          </a:xfrm>
+          <a:prstGeom prst="rect">
+            <a:avLst/>
+          </a:prstGeom>
+          <a:noFill/>
+        </p:spPr>
         <p:txBody>
-          <a:bodyPr/>
+          <a:bodyPr wrap="square" rtlCol="0">
+            <a:spAutoFit/>
+          </a:bodyPr>
           <a:lstStyle/>
           <a:p>
-            <a:endParaRPr lang="en-US"/>
+            <a:r>
+              <a:rPr lang="en-US" dirty="0" smtClean="0"/>
+              <a:t>Construct a matrix with:</a:t>
+            </a:r>
+          </a:p>
+          <a:p>
+            <a:endParaRPr lang="en-US" dirty="0"/>
+          </a:p>
+          <a:p>
+            <a:pPr marL="285750" indent="-285750">
+              <a:buFont typeface="Arial" charset="0"/>
+              <a:buChar char="•"/>
+            </a:pPr>
+            <a:r>
+              <a:rPr lang="en-US" dirty="0" err="1" smtClean="0"/>
+              <a:t>Num</a:t>
+            </a:r>
+            <a:r>
+              <a:rPr lang="en-US" dirty="0" smtClean="0"/>
+              <a:t> of document rows</a:t>
+            </a:r>
+            <a:endParaRPr lang="en-US" dirty="0"/>
+          </a:p>
+          <a:p>
+            <a:pPr marL="285750" indent="-285750">
+              <a:buFont typeface="Arial" charset="0"/>
+              <a:buChar char="•"/>
+            </a:pPr>
+            <a:r>
+              <a:rPr lang="en-US" dirty="0" smtClean="0"/>
+              <a:t>Length of vocabulary columns</a:t>
+            </a:r>
+          </a:p>
+          <a:p>
+            <a:endParaRPr lang="en-US" dirty="0"/>
+          </a:p>
+          <a:p>
+            <a:endParaRPr lang="en-US" dirty="0"/>
           </a:p>
         </p:txBody>
       </p:sp>
     </p:spTree>
     <p:extLst>
       <p:ext uri="{BB962C8B-B14F-4D97-AF65-F5344CB8AC3E}">
-        <p14:creationId xmlns:p14="http://schemas.microsoft.com/office/powerpoint/2010/main" val="1988511273"/>
+        <p14:creationId xmlns:p14="http://schemas.microsoft.com/office/powerpoint/2010/main" val="1007347461"/>
       </p:ext>
     </p:extLst>
   </p:cSld>

</xml_diff>